<commit_message>
Minor updates to Static presentation
Minor updates to Static presentation
</commit_message>
<xml_diff>
--- a/CSharpProgramming/Presentations/OOProgPartI/Static.pptx
+++ b/CSharpProgramming/Presentations/OOProgPartI/Static.pptx
@@ -16,12 +16,17 @@
     <p:sldId id="380" r:id="rId10"/>
     <p:sldId id="381" r:id="rId11"/>
     <p:sldId id="382" r:id="rId12"/>
-    <p:sldId id="383" r:id="rId13"/>
-    <p:sldId id="384" r:id="rId14"/>
-    <p:sldId id="385" r:id="rId15"/>
-    <p:sldId id="386" r:id="rId16"/>
-    <p:sldId id="388" r:id="rId17"/>
-    <p:sldId id="387" r:id="rId18"/>
+    <p:sldId id="389" r:id="rId13"/>
+    <p:sldId id="383" r:id="rId14"/>
+    <p:sldId id="390" r:id="rId15"/>
+    <p:sldId id="391" r:id="rId16"/>
+    <p:sldId id="392" r:id="rId17"/>
+    <p:sldId id="393" r:id="rId18"/>
+    <p:sldId id="384" r:id="rId19"/>
+    <p:sldId id="385" r:id="rId20"/>
+    <p:sldId id="386" r:id="rId21"/>
+    <p:sldId id="388" r:id="rId22"/>
+    <p:sldId id="387" r:id="rId23"/>
   </p:sldIdLst>
   <p:sldSz cx="12192000" cy="6858000"/>
   <p:notesSz cx="6858000" cy="9144000"/>
@@ -259,7 +264,7 @@
           <a:p>
             <a:fld id="{E15B7D8E-2A20-4C0E-991C-872DBB7459A8}" type="datetimeFigureOut">
               <a:rPr lang="da-DK" smtClean="0"/>
-              <a:t>19-02-2018</a:t>
+              <a:t>01-03-2018</a:t>
             </a:fld>
             <a:endParaRPr lang="da-DK"/>
           </a:p>
@@ -429,7 +434,7 @@
           <a:p>
             <a:fld id="{E15B7D8E-2A20-4C0E-991C-872DBB7459A8}" type="datetimeFigureOut">
               <a:rPr lang="da-DK" smtClean="0"/>
-              <a:t>19-02-2018</a:t>
+              <a:t>01-03-2018</a:t>
             </a:fld>
             <a:endParaRPr lang="da-DK"/>
           </a:p>
@@ -609,7 +614,7 @@
           <a:p>
             <a:fld id="{E15B7D8E-2A20-4C0E-991C-872DBB7459A8}" type="datetimeFigureOut">
               <a:rPr lang="da-DK" smtClean="0"/>
-              <a:t>19-02-2018</a:t>
+              <a:t>01-03-2018</a:t>
             </a:fld>
             <a:endParaRPr lang="da-DK"/>
           </a:p>
@@ -779,7 +784,7 @@
           <a:p>
             <a:fld id="{E15B7D8E-2A20-4C0E-991C-872DBB7459A8}" type="datetimeFigureOut">
               <a:rPr lang="da-DK" smtClean="0"/>
-              <a:t>19-02-2018</a:t>
+              <a:t>01-03-2018</a:t>
             </a:fld>
             <a:endParaRPr lang="da-DK"/>
           </a:p>
@@ -1025,7 +1030,7 @@
           <a:p>
             <a:fld id="{E15B7D8E-2A20-4C0E-991C-872DBB7459A8}" type="datetimeFigureOut">
               <a:rPr lang="da-DK" smtClean="0"/>
-              <a:t>19-02-2018</a:t>
+              <a:t>01-03-2018</a:t>
             </a:fld>
             <a:endParaRPr lang="da-DK"/>
           </a:p>
@@ -1257,7 +1262,7 @@
           <a:p>
             <a:fld id="{E15B7D8E-2A20-4C0E-991C-872DBB7459A8}" type="datetimeFigureOut">
               <a:rPr lang="da-DK" smtClean="0"/>
-              <a:t>19-02-2018</a:t>
+              <a:t>01-03-2018</a:t>
             </a:fld>
             <a:endParaRPr lang="da-DK"/>
           </a:p>
@@ -1624,7 +1629,7 @@
           <a:p>
             <a:fld id="{E15B7D8E-2A20-4C0E-991C-872DBB7459A8}" type="datetimeFigureOut">
               <a:rPr lang="da-DK" smtClean="0"/>
-              <a:t>19-02-2018</a:t>
+              <a:t>01-03-2018</a:t>
             </a:fld>
             <a:endParaRPr lang="da-DK"/>
           </a:p>
@@ -1742,7 +1747,7 @@
           <a:p>
             <a:fld id="{E15B7D8E-2A20-4C0E-991C-872DBB7459A8}" type="datetimeFigureOut">
               <a:rPr lang="da-DK" smtClean="0"/>
-              <a:t>19-02-2018</a:t>
+              <a:t>01-03-2018</a:t>
             </a:fld>
             <a:endParaRPr lang="da-DK"/>
           </a:p>
@@ -1837,7 +1842,7 @@
           <a:p>
             <a:fld id="{E15B7D8E-2A20-4C0E-991C-872DBB7459A8}" type="datetimeFigureOut">
               <a:rPr lang="da-DK" smtClean="0"/>
-              <a:t>19-02-2018</a:t>
+              <a:t>01-03-2018</a:t>
             </a:fld>
             <a:endParaRPr lang="da-DK"/>
           </a:p>
@@ -2114,7 +2119,7 @@
           <a:p>
             <a:fld id="{E15B7D8E-2A20-4C0E-991C-872DBB7459A8}" type="datetimeFigureOut">
               <a:rPr lang="da-DK" smtClean="0"/>
-              <a:t>19-02-2018</a:t>
+              <a:t>01-03-2018</a:t>
             </a:fld>
             <a:endParaRPr lang="da-DK"/>
           </a:p>
@@ -2367,7 +2372,7 @@
           <a:p>
             <a:fld id="{E15B7D8E-2A20-4C0E-991C-872DBB7459A8}" type="datetimeFigureOut">
               <a:rPr lang="da-DK" smtClean="0"/>
-              <a:t>19-02-2018</a:t>
+              <a:t>01-03-2018</a:t>
             </a:fld>
             <a:endParaRPr lang="da-DK"/>
           </a:p>
@@ -2580,7 +2585,7 @@
           <a:p>
             <a:fld id="{E15B7D8E-2A20-4C0E-991C-872DBB7459A8}" type="datetimeFigureOut">
               <a:rPr lang="da-DK" smtClean="0"/>
-              <a:t>19-02-2018</a:t>
+              <a:t>01-03-2018</a:t>
             </a:fld>
             <a:endParaRPr lang="da-DK"/>
           </a:p>
@@ -3121,13 +3126,7 @@
               <a:rPr lang="da-DK" sz="6000" b="1" smtClean="0">
                 <a:latin typeface="Consolas" panose="020B0609020204030204" pitchFamily="49" charset="0"/>
               </a:rPr>
-              <a:t> </a:t>
-            </a:r>
-            <a:r>
-              <a:rPr lang="da-DK" sz="6000" b="1" smtClean="0">
-                <a:latin typeface="Consolas" panose="020B0609020204030204" pitchFamily="49" charset="0"/>
-              </a:rPr>
-              <a:t>= </a:t>
+              <a:t> = </a:t>
             </a:r>
             <a:r>
               <a:rPr lang="da-DK" sz="6000" b="1" smtClean="0">
@@ -3144,13 +3143,7 @@
               <a:rPr lang="da-DK" sz="6000" b="1" smtClean="0">
                 <a:latin typeface="Consolas" panose="020B0609020204030204" pitchFamily="49" charset="0"/>
               </a:rPr>
-              <a:t>.Add(9, 13</a:t>
-            </a:r>
-            <a:r>
-              <a:rPr lang="da-DK" sz="6000" b="1" smtClean="0">
-                <a:latin typeface="Consolas" panose="020B0609020204030204" pitchFamily="49" charset="0"/>
-              </a:rPr>
-              <a:t>);</a:t>
+              <a:t>.Add(9, 13);</a:t>
             </a:r>
             <a:endParaRPr lang="da-DK" sz="6000" b="1">
               <a:latin typeface="Consolas" panose="020B0609020204030204" pitchFamily="49" charset="0"/>
@@ -3481,9 +3474,6 @@
               </a:rPr>
               <a:t>    …</a:t>
             </a:r>
-            <a:endParaRPr lang="da-DK" sz="2800" b="1" smtClean="0">
-              <a:latin typeface="Consolas" panose="020B0609020204030204" pitchFamily="49" charset="0"/>
-            </a:endParaRPr>
           </a:p>
           <a:p>
             <a:r>
@@ -3492,9 +3482,6 @@
               </a:rPr>
               <a:t>}</a:t>
             </a:r>
-            <a:endParaRPr lang="da-DK" sz="2800" b="1" smtClean="0">
-              <a:latin typeface="Consolas" panose="020B0609020204030204" pitchFamily="49" charset="0"/>
-            </a:endParaRPr>
           </a:p>
         </p:txBody>
       </p:sp>
@@ -3508,11 +3495,11 @@
   <p:clrMapOvr>
     <a:masterClrMapping/>
   </p:clrMapOvr>
-  <mc:AlternateContent xmlns:mc="http://schemas.openxmlformats.org/markup-compatibility/2006">
-    <mc:Choice xmlns:p14="http://schemas.microsoft.com/office/powerpoint/2010/main" Requires="p14">
+  <mc:AlternateContent xmlns:mc="http://schemas.openxmlformats.org/markup-compatibility/2006" xmlns:p14="http://schemas.microsoft.com/office/powerpoint/2010/main">
+    <mc:Choice Requires="p14">
       <p:transition p14:dur="0"/>
     </mc:Choice>
-    <mc:Fallback>
+    <mc:Fallback xmlns="">
       <p:transition/>
     </mc:Fallback>
   </mc:AlternateContent>
@@ -3545,14 +3532,64 @@
       </p:grpSpPr>
       <p:sp>
         <p:nvSpPr>
-          <p:cNvPr id="2" name="Tekstfelt 1"/>
+          <p:cNvPr id="4" name="Sky 3"/>
+          <p:cNvSpPr/>
+          <p:nvPr/>
+        </p:nvSpPr>
+        <p:spPr>
+          <a:xfrm>
+            <a:off x="4013691" y="1622284"/>
+            <a:ext cx="3582248" cy="2375829"/>
+          </a:xfrm>
+          <a:prstGeom prst="cloud">
+            <a:avLst/>
+          </a:prstGeom>
+        </p:spPr>
+        <p:style>
+          <a:lnRef idx="2">
+            <a:schemeClr val="accent1">
+              <a:shade val="50000"/>
+            </a:schemeClr>
+          </a:lnRef>
+          <a:fillRef idx="1">
+            <a:schemeClr val="accent1"/>
+          </a:fillRef>
+          <a:effectRef idx="0">
+            <a:schemeClr val="accent1"/>
+          </a:effectRef>
+          <a:fontRef idx="minor">
+            <a:schemeClr val="lt1"/>
+          </a:fontRef>
+        </p:style>
+        <p:txBody>
+          <a:bodyPr rtlCol="0" anchor="ctr"/>
+          <a:lstStyle/>
+          <a:p>
+            <a:r>
+              <a:rPr lang="da-DK" sz="2800" smtClean="0"/>
+              <a:t>_licensePlate</a:t>
+            </a:r>
+            <a:endParaRPr lang="da-DK" sz="2800" smtClean="0"/>
+          </a:p>
+          <a:p>
+            <a:r>
+              <a:rPr lang="da-DK" sz="2800" smtClean="0"/>
+              <a:t>_price</a:t>
+            </a:r>
+            <a:endParaRPr lang="da-DK" sz="2800"/>
+          </a:p>
+        </p:txBody>
+      </p:sp>
+      <p:sp>
+        <p:nvSpPr>
+          <p:cNvPr id="5" name="Tekstfelt 4"/>
           <p:cNvSpPr txBox="1"/>
           <p:nvPr/>
         </p:nvSpPr>
         <p:spPr>
           <a:xfrm>
-            <a:off x="920415" y="672345"/>
-            <a:ext cx="10485521" cy="2677656"/>
+            <a:off x="718169" y="452788"/>
+            <a:ext cx="4920631" cy="646331"/>
           </a:xfrm>
           <a:prstGeom prst="rect">
             <a:avLst/>
@@ -3566,148 +3603,121 @@
           <a:lstStyle/>
           <a:p>
             <a:r>
-              <a:rPr lang="da-DK" sz="2800" b="1" smtClean="0">
-                <a:solidFill>
-                  <a:srgbClr val="0070C0"/>
-                </a:solidFill>
-                <a:latin typeface="Consolas" panose="020B0609020204030204" pitchFamily="49" charset="0"/>
-              </a:rPr>
-              <a:t>public </a:t>
-            </a:r>
-            <a:r>
-              <a:rPr lang="da-DK" sz="2800" b="1" smtClean="0">
-                <a:latin typeface="Consolas" panose="020B0609020204030204" pitchFamily="49" charset="0"/>
-              </a:rPr>
-              <a:t>Car(</a:t>
-            </a:r>
-            <a:r>
-              <a:rPr lang="da-DK" sz="2800" b="1" smtClean="0">
-                <a:solidFill>
-                  <a:srgbClr val="0070C0"/>
-                </a:solidFill>
-                <a:latin typeface="Consolas" panose="020B0609020204030204" pitchFamily="49" charset="0"/>
-              </a:rPr>
-              <a:t>string</a:t>
-            </a:r>
-            <a:r>
-              <a:rPr lang="da-DK" sz="2800" b="1" smtClean="0">
-                <a:latin typeface="Consolas" panose="020B0609020204030204" pitchFamily="49" charset="0"/>
-              </a:rPr>
-              <a:t> licensePlate</a:t>
-            </a:r>
-            <a:r>
-              <a:rPr lang="da-DK" sz="2800" b="1" smtClean="0">
-                <a:latin typeface="Consolas" panose="020B0609020204030204" pitchFamily="49" charset="0"/>
-              </a:rPr>
-              <a:t>, </a:t>
-            </a:r>
-            <a:r>
-              <a:rPr lang="da-DK" sz="2800" b="1" smtClean="0">
-                <a:solidFill>
-                  <a:srgbClr val="0070C0"/>
-                </a:solidFill>
-                <a:latin typeface="Consolas" panose="020B0609020204030204" pitchFamily="49" charset="0"/>
-              </a:rPr>
-              <a:t>int</a:t>
-            </a:r>
-            <a:r>
-              <a:rPr lang="da-DK" sz="2800" b="1" smtClean="0">
-                <a:latin typeface="Consolas" panose="020B0609020204030204" pitchFamily="49" charset="0"/>
-              </a:rPr>
-              <a:t> </a:t>
-            </a:r>
-            <a:r>
-              <a:rPr lang="da-DK" sz="2800" b="1" smtClean="0">
-                <a:latin typeface="Consolas" panose="020B0609020204030204" pitchFamily="49" charset="0"/>
-              </a:rPr>
-              <a:t>price)</a:t>
-            </a:r>
-            <a:endParaRPr lang="da-DK" sz="2800" b="1">
+              <a:rPr lang="da-DK" sz="3600" b="1" smtClean="0">
+                <a:latin typeface="Consolas" panose="020B0609020204030204" pitchFamily="49" charset="0"/>
+              </a:rPr>
+              <a:t>_noOfCarsCreated</a:t>
+            </a:r>
+            <a:endParaRPr lang="da-DK" sz="3600" b="1">
               <a:latin typeface="Consolas" panose="020B0609020204030204" pitchFamily="49" charset="0"/>
             </a:endParaRPr>
           </a:p>
-          <a:p>
-            <a:r>
-              <a:rPr lang="da-DK" sz="2800" b="1" smtClean="0">
-                <a:latin typeface="Consolas" panose="020B0609020204030204" pitchFamily="49" charset="0"/>
-              </a:rPr>
-              <a:t>{</a:t>
-            </a:r>
-          </a:p>
-          <a:p>
-            <a:r>
-              <a:rPr lang="da-DK" sz="2800" b="1" smtClean="0">
-                <a:latin typeface="Consolas" panose="020B0609020204030204" pitchFamily="49" charset="0"/>
-              </a:rPr>
-              <a:t>    _licensePlate = </a:t>
-            </a:r>
-            <a:r>
-              <a:rPr lang="da-DK" sz="2800" b="1">
-                <a:latin typeface="Consolas" panose="020B0609020204030204" pitchFamily="49" charset="0"/>
-              </a:rPr>
-              <a:t>licensePlate</a:t>
-            </a:r>
-            <a:r>
-              <a:rPr lang="da-DK" sz="2800" b="1" smtClean="0">
-                <a:latin typeface="Consolas" panose="020B0609020204030204" pitchFamily="49" charset="0"/>
-              </a:rPr>
-              <a:t>;</a:t>
-            </a:r>
-          </a:p>
-          <a:p>
-            <a:r>
-              <a:rPr lang="da-DK" sz="2800" b="1" smtClean="0">
-                <a:latin typeface="Consolas" panose="020B0609020204030204" pitchFamily="49" charset="0"/>
-              </a:rPr>
-              <a:t>    _brand = </a:t>
-            </a:r>
-            <a:r>
-              <a:rPr lang="da-DK" sz="2800" b="1">
-                <a:latin typeface="Consolas" panose="020B0609020204030204" pitchFamily="49" charset="0"/>
-              </a:rPr>
-              <a:t>brand</a:t>
-            </a:r>
-            <a:r>
-              <a:rPr lang="da-DK" sz="2800" b="1" smtClean="0">
-                <a:latin typeface="Consolas" panose="020B0609020204030204" pitchFamily="49" charset="0"/>
-              </a:rPr>
-              <a:t>;</a:t>
-            </a:r>
-          </a:p>
-          <a:p>
-            <a:r>
-              <a:rPr lang="da-DK" sz="2800" b="1">
-                <a:latin typeface="Consolas" panose="020B0609020204030204" pitchFamily="49" charset="0"/>
-              </a:rPr>
-              <a:t> </a:t>
-            </a:r>
-            <a:r>
-              <a:rPr lang="da-DK" sz="2800" b="1" smtClean="0">
-                <a:latin typeface="Consolas" panose="020B0609020204030204" pitchFamily="49" charset="0"/>
-              </a:rPr>
-              <a:t>   _noOfCarsCreated++;</a:t>
-            </a:r>
-            <a:endParaRPr lang="da-DK" sz="2800" b="1" smtClean="0">
-              <a:latin typeface="Consolas" panose="020B0609020204030204" pitchFamily="49" charset="0"/>
-            </a:endParaRPr>
-          </a:p>
-          <a:p>
-            <a:r>
-              <a:rPr lang="da-DK" sz="2800" b="1" smtClean="0">
-                <a:latin typeface="Consolas" panose="020B0609020204030204" pitchFamily="49" charset="0"/>
-              </a:rPr>
-              <a:t>}</a:t>
-            </a:r>
-            <a:endParaRPr lang="da-DK" sz="2800" b="1" smtClean="0">
-              <a:latin typeface="Consolas" panose="020B0609020204030204" pitchFamily="49" charset="0"/>
-            </a:endParaRPr>
+        </p:txBody>
+      </p:sp>
+      <p:sp>
+        <p:nvSpPr>
+          <p:cNvPr id="6" name="Sky 5"/>
+          <p:cNvSpPr/>
+          <p:nvPr/>
+        </p:nvSpPr>
+        <p:spPr>
+          <a:xfrm>
+            <a:off x="7984111" y="3150677"/>
+            <a:ext cx="3582248" cy="2375829"/>
+          </a:xfrm>
+          <a:prstGeom prst="cloud">
+            <a:avLst/>
+          </a:prstGeom>
+        </p:spPr>
+        <p:style>
+          <a:lnRef idx="2">
+            <a:schemeClr val="accent1">
+              <a:shade val="50000"/>
+            </a:schemeClr>
+          </a:lnRef>
+          <a:fillRef idx="1">
+            <a:schemeClr val="accent1"/>
+          </a:fillRef>
+          <a:effectRef idx="0">
+            <a:schemeClr val="accent1"/>
+          </a:effectRef>
+          <a:fontRef idx="minor">
+            <a:schemeClr val="lt1"/>
+          </a:fontRef>
+        </p:style>
+        <p:txBody>
+          <a:bodyPr rtlCol="0" anchor="ctr"/>
+          <a:lstStyle/>
+          <a:p>
+            <a:r>
+              <a:rPr lang="da-DK" sz="2800" smtClean="0"/>
+              <a:t>_licensePlate</a:t>
+            </a:r>
+            <a:endParaRPr lang="da-DK" sz="2800" smtClean="0"/>
+          </a:p>
+          <a:p>
+            <a:r>
+              <a:rPr lang="da-DK" sz="2800" smtClean="0"/>
+              <a:t>_price</a:t>
+            </a:r>
+            <a:endParaRPr lang="da-DK" sz="2800"/>
+          </a:p>
+        </p:txBody>
+      </p:sp>
+      <p:sp>
+        <p:nvSpPr>
+          <p:cNvPr id="7" name="Sky 6"/>
+          <p:cNvSpPr/>
+          <p:nvPr/>
+        </p:nvSpPr>
+        <p:spPr>
+          <a:xfrm>
+            <a:off x="718169" y="3804794"/>
+            <a:ext cx="3582248" cy="2375829"/>
+          </a:xfrm>
+          <a:prstGeom prst="cloud">
+            <a:avLst/>
+          </a:prstGeom>
+        </p:spPr>
+        <p:style>
+          <a:lnRef idx="2">
+            <a:schemeClr val="accent1">
+              <a:shade val="50000"/>
+            </a:schemeClr>
+          </a:lnRef>
+          <a:fillRef idx="1">
+            <a:schemeClr val="accent1"/>
+          </a:fillRef>
+          <a:effectRef idx="0">
+            <a:schemeClr val="accent1"/>
+          </a:effectRef>
+          <a:fontRef idx="minor">
+            <a:schemeClr val="lt1"/>
+          </a:fontRef>
+        </p:style>
+        <p:txBody>
+          <a:bodyPr rtlCol="0" anchor="ctr"/>
+          <a:lstStyle/>
+          <a:p>
+            <a:r>
+              <a:rPr lang="da-DK" sz="2800" smtClean="0"/>
+              <a:t>_licensePlate</a:t>
+            </a:r>
+            <a:endParaRPr lang="da-DK" sz="2800" smtClean="0"/>
+          </a:p>
+          <a:p>
+            <a:r>
+              <a:rPr lang="da-DK" sz="2800" smtClean="0"/>
+              <a:t>_price</a:t>
+            </a:r>
+            <a:endParaRPr lang="da-DK" sz="2800"/>
           </a:p>
         </p:txBody>
       </p:sp>
     </p:spTree>
     <p:extLst>
       <p:ext uri="{BB962C8B-B14F-4D97-AF65-F5344CB8AC3E}">
-        <p14:creationId xmlns:p14="http://schemas.microsoft.com/office/powerpoint/2010/main" val="3932962872"/>
+        <p14:creationId xmlns:p14="http://schemas.microsoft.com/office/powerpoint/2010/main" val="4006345021"/>
       </p:ext>
     </p:extLst>
   </p:cSld>
@@ -3716,22 +3726,205 @@
   </p:clrMapOvr>
   <mc:AlternateContent xmlns:mc="http://schemas.openxmlformats.org/markup-compatibility/2006">
     <mc:Choice xmlns:p14="http://schemas.microsoft.com/office/powerpoint/2010/main" Requires="p14">
-      <p:transition spd="med" p14:dur="700">
-        <p:fade/>
-      </p:transition>
+      <p:transition p14:dur="0"/>
     </mc:Choice>
     <mc:Fallback>
-      <p:transition spd="med">
-        <p:fade/>
-      </p:transition>
+      <p:transition/>
     </mc:Fallback>
   </mc:AlternateContent>
   <p:timing>
     <p:tnLst>
       <p:par>
-        <p:cTn id="1" dur="indefinite" restart="never" nodeType="tmRoot"/>
+        <p:cTn id="1" dur="indefinite" restart="never" nodeType="tmRoot">
+          <p:childTnLst>
+            <p:seq concurrent="1" nextAc="seek">
+              <p:cTn id="2" dur="indefinite" nodeType="mainSeq">
+                <p:childTnLst>
+                  <p:par>
+                    <p:cTn id="3" fill="hold">
+                      <p:stCondLst>
+                        <p:cond delay="indefinite"/>
+                      </p:stCondLst>
+                      <p:childTnLst>
+                        <p:par>
+                          <p:cTn id="4" fill="hold">
+                            <p:stCondLst>
+                              <p:cond delay="0"/>
+                            </p:stCondLst>
+                            <p:childTnLst>
+                              <p:par>
+                                <p:cTn id="5" presetID="10" presetClass="entr" presetSubtype="0" fill="hold" grpId="0" nodeType="clickEffect">
+                                  <p:stCondLst>
+                                    <p:cond delay="0"/>
+                                  </p:stCondLst>
+                                  <p:childTnLst>
+                                    <p:set>
+                                      <p:cBhvr>
+                                        <p:cTn id="6" dur="1" fill="hold">
+                                          <p:stCondLst>
+                                            <p:cond delay="0"/>
+                                          </p:stCondLst>
+                                        </p:cTn>
+                                        <p:tgtEl>
+                                          <p:spTgt spid="7"/>
+                                        </p:tgtEl>
+                                        <p:attrNameLst>
+                                          <p:attrName>style.visibility</p:attrName>
+                                        </p:attrNameLst>
+                                      </p:cBhvr>
+                                      <p:to>
+                                        <p:strVal val="visible"/>
+                                      </p:to>
+                                    </p:set>
+                                    <p:animEffect transition="in" filter="fade">
+                                      <p:cBhvr>
+                                        <p:cTn id="7" dur="500"/>
+                                        <p:tgtEl>
+                                          <p:spTgt spid="7"/>
+                                        </p:tgtEl>
+                                      </p:cBhvr>
+                                    </p:animEffect>
+                                  </p:childTnLst>
+                                </p:cTn>
+                              </p:par>
+                              <p:par>
+                                <p:cTn id="8" presetID="10" presetClass="entr" presetSubtype="0" fill="hold" grpId="0" nodeType="withEffect">
+                                  <p:stCondLst>
+                                    <p:cond delay="500"/>
+                                  </p:stCondLst>
+                                  <p:childTnLst>
+                                    <p:set>
+                                      <p:cBhvr>
+                                        <p:cTn id="9" dur="1" fill="hold">
+                                          <p:stCondLst>
+                                            <p:cond delay="0"/>
+                                          </p:stCondLst>
+                                        </p:cTn>
+                                        <p:tgtEl>
+                                          <p:spTgt spid="4"/>
+                                        </p:tgtEl>
+                                        <p:attrNameLst>
+                                          <p:attrName>style.visibility</p:attrName>
+                                        </p:attrNameLst>
+                                      </p:cBhvr>
+                                      <p:to>
+                                        <p:strVal val="visible"/>
+                                      </p:to>
+                                    </p:set>
+                                    <p:animEffect transition="in" filter="fade">
+                                      <p:cBhvr>
+                                        <p:cTn id="10" dur="500"/>
+                                        <p:tgtEl>
+                                          <p:spTgt spid="4"/>
+                                        </p:tgtEl>
+                                      </p:cBhvr>
+                                    </p:animEffect>
+                                  </p:childTnLst>
+                                </p:cTn>
+                              </p:par>
+                              <p:par>
+                                <p:cTn id="11" presetID="10" presetClass="entr" presetSubtype="0" fill="hold" grpId="0" nodeType="withEffect">
+                                  <p:stCondLst>
+                                    <p:cond delay="1000"/>
+                                  </p:stCondLst>
+                                  <p:childTnLst>
+                                    <p:set>
+                                      <p:cBhvr>
+                                        <p:cTn id="12" dur="1" fill="hold">
+                                          <p:stCondLst>
+                                            <p:cond delay="0"/>
+                                          </p:stCondLst>
+                                        </p:cTn>
+                                        <p:tgtEl>
+                                          <p:spTgt spid="6"/>
+                                        </p:tgtEl>
+                                        <p:attrNameLst>
+                                          <p:attrName>style.visibility</p:attrName>
+                                        </p:attrNameLst>
+                                      </p:cBhvr>
+                                      <p:to>
+                                        <p:strVal val="visible"/>
+                                      </p:to>
+                                    </p:set>
+                                    <p:animEffect transition="in" filter="fade">
+                                      <p:cBhvr>
+                                        <p:cTn id="13" dur="500"/>
+                                        <p:tgtEl>
+                                          <p:spTgt spid="6"/>
+                                        </p:tgtEl>
+                                      </p:cBhvr>
+                                    </p:animEffect>
+                                  </p:childTnLst>
+                                </p:cTn>
+                              </p:par>
+                              <p:par>
+                                <p:cTn id="14" presetID="10" presetClass="entr" presetSubtype="0" fill="hold" grpId="0" nodeType="withEffect">
+                                  <p:stCondLst>
+                                    <p:cond delay="2000"/>
+                                  </p:stCondLst>
+                                  <p:childTnLst>
+                                    <p:set>
+                                      <p:cBhvr>
+                                        <p:cTn id="15" dur="1" fill="hold">
+                                          <p:stCondLst>
+                                            <p:cond delay="0"/>
+                                          </p:stCondLst>
+                                        </p:cTn>
+                                        <p:tgtEl>
+                                          <p:spTgt spid="5"/>
+                                        </p:tgtEl>
+                                        <p:attrNameLst>
+                                          <p:attrName>style.visibility</p:attrName>
+                                        </p:attrNameLst>
+                                      </p:cBhvr>
+                                      <p:to>
+                                        <p:strVal val="visible"/>
+                                      </p:to>
+                                    </p:set>
+                                    <p:animEffect transition="in" filter="fade">
+                                      <p:cBhvr>
+                                        <p:cTn id="16" dur="500"/>
+                                        <p:tgtEl>
+                                          <p:spTgt spid="5"/>
+                                        </p:tgtEl>
+                                      </p:cBhvr>
+                                    </p:animEffect>
+                                  </p:childTnLst>
+                                </p:cTn>
+                              </p:par>
+                            </p:childTnLst>
+                          </p:cTn>
+                        </p:par>
+                      </p:childTnLst>
+                    </p:cTn>
+                  </p:par>
+                </p:childTnLst>
+              </p:cTn>
+              <p:prevCondLst>
+                <p:cond evt="onPrev" delay="0">
+                  <p:tgtEl>
+                    <p:sldTgt/>
+                  </p:tgtEl>
+                </p:cond>
+              </p:prevCondLst>
+              <p:nextCondLst>
+                <p:cond evt="onNext" delay="0">
+                  <p:tgtEl>
+                    <p:sldTgt/>
+                  </p:tgtEl>
+                </p:cond>
+              </p:nextCondLst>
+            </p:seq>
+          </p:childTnLst>
+        </p:cTn>
       </p:par>
     </p:tnLst>
+    <p:bldLst>
+      <p:bldP spid="4" grpId="0" animBg="1"/>
+      <p:bldP spid="5" grpId="0"/>
+      <p:bldP spid="6" grpId="0" animBg="1"/>
+      <p:bldP spid="7" grpId="0" animBg="1"/>
+    </p:bldLst>
   </p:timing>
 </p:sld>
 </file>
@@ -3762,7 +3955,7 @@
         <p:spPr>
           <a:xfrm>
             <a:off x="920415" y="672345"/>
-            <a:ext cx="10485521" cy="1815882"/>
+            <a:ext cx="10485521" cy="2677656"/>
           </a:xfrm>
           <a:prstGeom prst="rect">
             <a:avLst/>
@@ -3782,13 +3975,126 @@
                 </a:solidFill>
                 <a:latin typeface="Consolas" panose="020B0609020204030204" pitchFamily="49" charset="0"/>
               </a:rPr>
-              <a:t>public static int</a:t>
-            </a:r>
-            <a:r>
-              <a:rPr lang="da-DK" sz="2800" b="1" smtClean="0">
-                <a:latin typeface="Consolas" panose="020B0609020204030204" pitchFamily="49" charset="0"/>
-              </a:rPr>
-              <a:t> NoOfCarsCreated</a:t>
+              <a:t>public </a:t>
+            </a:r>
+            <a:r>
+              <a:rPr lang="da-DK" sz="2800" b="1" smtClean="0">
+                <a:latin typeface="Consolas" panose="020B0609020204030204" pitchFamily="49" charset="0"/>
+              </a:rPr>
+              <a:t>Car(</a:t>
+            </a:r>
+            <a:r>
+              <a:rPr lang="da-DK" sz="2800" b="1" smtClean="0">
+                <a:solidFill>
+                  <a:srgbClr val="0070C0"/>
+                </a:solidFill>
+                <a:latin typeface="Consolas" panose="020B0609020204030204" pitchFamily="49" charset="0"/>
+              </a:rPr>
+              <a:t>string</a:t>
+            </a:r>
+            <a:r>
+              <a:rPr lang="da-DK" sz="2800" b="1" smtClean="0">
+                <a:latin typeface="Consolas" panose="020B0609020204030204" pitchFamily="49" charset="0"/>
+              </a:rPr>
+              <a:t> licensePlate, </a:t>
+            </a:r>
+            <a:r>
+              <a:rPr lang="da-DK" sz="2800" b="1" smtClean="0">
+                <a:solidFill>
+                  <a:srgbClr val="0070C0"/>
+                </a:solidFill>
+                <a:latin typeface="Consolas" panose="020B0609020204030204" pitchFamily="49" charset="0"/>
+              </a:rPr>
+              <a:t>int</a:t>
+            </a:r>
+            <a:r>
+              <a:rPr lang="da-DK" sz="2800" b="1" smtClean="0">
+                <a:latin typeface="Consolas" panose="020B0609020204030204" pitchFamily="49" charset="0"/>
+              </a:rPr>
+              <a:t> price)</a:t>
+            </a:r>
+            <a:endParaRPr lang="da-DK" sz="2800" b="1">
+              <a:latin typeface="Consolas" panose="020B0609020204030204" pitchFamily="49" charset="0"/>
+            </a:endParaRPr>
+          </a:p>
+          <a:p>
+            <a:r>
+              <a:rPr lang="da-DK" sz="2800" b="1" smtClean="0">
+                <a:latin typeface="Consolas" panose="020B0609020204030204" pitchFamily="49" charset="0"/>
+              </a:rPr>
+              <a:t>{</a:t>
+            </a:r>
+          </a:p>
+          <a:p>
+            <a:r>
+              <a:rPr lang="da-DK" sz="2800" b="1" smtClean="0">
+                <a:latin typeface="Consolas" panose="020B0609020204030204" pitchFamily="49" charset="0"/>
+              </a:rPr>
+              <a:t>    _licensePlate = </a:t>
+            </a:r>
+            <a:r>
+              <a:rPr lang="da-DK" sz="2800" b="1">
+                <a:latin typeface="Consolas" panose="020B0609020204030204" pitchFamily="49" charset="0"/>
+              </a:rPr>
+              <a:t>licensePlate</a:t>
+            </a:r>
+            <a:r>
+              <a:rPr lang="da-DK" sz="2800" b="1" smtClean="0">
+                <a:latin typeface="Consolas" panose="020B0609020204030204" pitchFamily="49" charset="0"/>
+              </a:rPr>
+              <a:t>;</a:t>
+            </a:r>
+          </a:p>
+          <a:p>
+            <a:r>
+              <a:rPr lang="da-DK" sz="2800" b="1" smtClean="0">
+                <a:latin typeface="Consolas" panose="020B0609020204030204" pitchFamily="49" charset="0"/>
+              </a:rPr>
+              <a:t>    _brand = </a:t>
+            </a:r>
+            <a:r>
+              <a:rPr lang="da-DK" sz="2800" b="1">
+                <a:latin typeface="Consolas" panose="020B0609020204030204" pitchFamily="49" charset="0"/>
+              </a:rPr>
+              <a:t>brand</a:t>
+            </a:r>
+            <a:r>
+              <a:rPr lang="da-DK" sz="2800" b="1" smtClean="0">
+                <a:latin typeface="Consolas" panose="020B0609020204030204" pitchFamily="49" charset="0"/>
+              </a:rPr>
+              <a:t>;</a:t>
+            </a:r>
+          </a:p>
+          <a:p>
+            <a:r>
+              <a:rPr lang="da-DK" sz="2800" b="1">
+                <a:latin typeface="Consolas" panose="020B0609020204030204" pitchFamily="49" charset="0"/>
+              </a:rPr>
+              <a:t> </a:t>
+            </a:r>
+            <a:r>
+              <a:rPr lang="da-DK" sz="2800" b="1" smtClean="0">
+                <a:latin typeface="Consolas" panose="020B0609020204030204" pitchFamily="49" charset="0"/>
+              </a:rPr>
+              <a:t>   _</a:t>
+            </a:r>
+            <a:r>
+              <a:rPr lang="da-DK" sz="2800" b="1" smtClean="0">
+                <a:latin typeface="Consolas" panose="020B0609020204030204" pitchFamily="49" charset="0"/>
+              </a:rPr>
+              <a:t>noOfCarsCreated</a:t>
+            </a:r>
+            <a:r>
+              <a:rPr lang="da-DK" sz="2800" b="1">
+                <a:latin typeface="Consolas" panose="020B0609020204030204" pitchFamily="49" charset="0"/>
+              </a:rPr>
+              <a:t> </a:t>
+            </a:r>
+            <a:r>
+              <a:rPr lang="da-DK" sz="2800" b="1" smtClean="0">
+                <a:latin typeface="Consolas" panose="020B0609020204030204" pitchFamily="49" charset="0"/>
+              </a:rPr>
+              <a:t>= _noOfCarsCreated + 1;</a:t>
             </a:r>
             <a:endParaRPr lang="da-DK" sz="2800" b="1" smtClean="0">
               <a:latin typeface="Consolas" panose="020B0609020204030204" pitchFamily="49" charset="0"/>
@@ -3799,76 +4105,6 @@
               <a:rPr lang="da-DK" sz="2800" b="1" smtClean="0">
                 <a:latin typeface="Consolas" panose="020B0609020204030204" pitchFamily="49" charset="0"/>
               </a:rPr>
-              <a:t>{</a:t>
-            </a:r>
-          </a:p>
-          <a:p>
-            <a:r>
-              <a:rPr lang="da-DK" sz="2800" b="1">
-                <a:latin typeface="Consolas" panose="020B0609020204030204" pitchFamily="49" charset="0"/>
-              </a:rPr>
-              <a:t> </a:t>
-            </a:r>
-            <a:r>
-              <a:rPr lang="da-DK" sz="2800" b="1" smtClean="0">
-                <a:latin typeface="Consolas" panose="020B0609020204030204" pitchFamily="49" charset="0"/>
-              </a:rPr>
-              <a:t>   </a:t>
-            </a:r>
-            <a:r>
-              <a:rPr lang="da-DK" sz="2800" b="1" smtClean="0">
-                <a:solidFill>
-                  <a:srgbClr val="0070C0"/>
-                </a:solidFill>
-                <a:latin typeface="Consolas" panose="020B0609020204030204" pitchFamily="49" charset="0"/>
-              </a:rPr>
-              <a:t>get </a:t>
-            </a:r>
-            <a:r>
-              <a:rPr lang="da-DK" sz="2800" b="1" smtClean="0">
-                <a:latin typeface="Consolas" panose="020B0609020204030204" pitchFamily="49" charset="0"/>
-              </a:rPr>
-              <a:t>{ </a:t>
-            </a:r>
-            <a:r>
-              <a:rPr lang="da-DK" sz="2800" b="1">
-                <a:solidFill>
-                  <a:srgbClr val="0070C0"/>
-                </a:solidFill>
-                <a:latin typeface="Consolas" panose="020B0609020204030204" pitchFamily="49" charset="0"/>
-              </a:rPr>
-              <a:t>return</a:t>
-            </a:r>
-            <a:r>
-              <a:rPr lang="da-DK" sz="2800" b="1" smtClean="0">
-                <a:latin typeface="Consolas" panose="020B0609020204030204" pitchFamily="49" charset="0"/>
-              </a:rPr>
-              <a:t> </a:t>
-            </a:r>
-            <a:r>
-              <a:rPr lang="en-US" sz="2800" b="1" smtClean="0">
-                <a:latin typeface="Consolas" panose="020B0609020204030204" pitchFamily="49" charset="0"/>
-              </a:rPr>
-              <a:t>_noOfCarsCreated;</a:t>
-            </a:r>
-            <a:r>
-              <a:rPr lang="da-DK" sz="2800" b="1" smtClean="0">
-                <a:latin typeface="Consolas" panose="020B0609020204030204" pitchFamily="49" charset="0"/>
-              </a:rPr>
-              <a:t> </a:t>
-            </a:r>
-            <a:r>
-              <a:rPr lang="da-DK" sz="2800" b="1" smtClean="0">
-                <a:latin typeface="Consolas" panose="020B0609020204030204" pitchFamily="49" charset="0"/>
-              </a:rPr>
-              <a:t>}</a:t>
-            </a:r>
-          </a:p>
-          <a:p>
-            <a:r>
-              <a:rPr lang="da-DK" sz="2800" b="1" smtClean="0">
-                <a:latin typeface="Consolas" panose="020B0609020204030204" pitchFamily="49" charset="0"/>
-              </a:rPr>
               <a:t>}</a:t>
             </a:r>
           </a:p>
@@ -3877,7 +4113,7 @@
     </p:spTree>
     <p:extLst>
       <p:ext uri="{BB962C8B-B14F-4D97-AF65-F5344CB8AC3E}">
-        <p14:creationId xmlns:p14="http://schemas.microsoft.com/office/powerpoint/2010/main" val="1801519129"/>
+        <p14:creationId xmlns:p14="http://schemas.microsoft.com/office/powerpoint/2010/main" val="3932962872"/>
       </p:ext>
     </p:extLst>
   </p:cSld>
@@ -3886,14 +4122,10 @@
   </p:clrMapOvr>
   <mc:AlternateContent xmlns:mc="http://schemas.openxmlformats.org/markup-compatibility/2006">
     <mc:Choice xmlns:p14="http://schemas.microsoft.com/office/powerpoint/2010/main" Requires="p14">
-      <p:transition spd="med" p14:dur="700">
-        <p:fade/>
-      </p:transition>
+      <p:transition p14:dur="0"/>
     </mc:Choice>
     <mc:Fallback>
-      <p:transition spd="med">
-        <p:fade/>
-      </p:transition>
+      <p:transition/>
     </mc:Fallback>
   </mc:AlternateContent>
   <p:timing>
@@ -3925,14 +4157,14 @@
       </p:grpSpPr>
       <p:sp>
         <p:nvSpPr>
-          <p:cNvPr id="2" name="Tekstfelt 1"/>
+          <p:cNvPr id="5" name="Tekstfelt 4"/>
           <p:cNvSpPr txBox="1"/>
           <p:nvPr/>
         </p:nvSpPr>
         <p:spPr>
           <a:xfrm>
-            <a:off x="900096" y="685892"/>
-            <a:ext cx="10214944" cy="3970318"/>
+            <a:off x="718169" y="452788"/>
+            <a:ext cx="6069130" cy="646331"/>
           </a:xfrm>
           <a:prstGeom prst="rect">
             <a:avLst/>
@@ -3946,171 +4178,12 @@
           <a:lstStyle/>
           <a:p>
             <a:r>
-              <a:rPr lang="da-DK" sz="2800" b="1" smtClean="0">
-                <a:solidFill>
-                  <a:srgbClr val="0070C0"/>
-                </a:solidFill>
-                <a:latin typeface="Consolas" panose="020B0609020204030204" pitchFamily="49" charset="0"/>
-              </a:rPr>
-              <a:t>public class</a:t>
-            </a:r>
-            <a:r>
-              <a:rPr lang="da-DK" sz="2800" b="1" smtClean="0">
-                <a:latin typeface="Consolas" panose="020B0609020204030204" pitchFamily="49" charset="0"/>
-              </a:rPr>
-              <a:t> </a:t>
-            </a:r>
-            <a:r>
-              <a:rPr lang="da-DK" sz="2800" b="1" smtClean="0">
-                <a:solidFill>
-                  <a:schemeClr val="accent6">
-                    <a:lumMod val="75000"/>
-                  </a:schemeClr>
-                </a:solidFill>
-                <a:latin typeface="Consolas" panose="020B0609020204030204" pitchFamily="49" charset="0"/>
-              </a:rPr>
-              <a:t>Car</a:t>
-            </a:r>
-          </a:p>
-          <a:p>
-            <a:r>
-              <a:rPr lang="da-DK" sz="2800" b="1" smtClean="0">
-                <a:latin typeface="Consolas" panose="020B0609020204030204" pitchFamily="49" charset="0"/>
-              </a:rPr>
-              <a:t>{</a:t>
-            </a:r>
-          </a:p>
-          <a:p>
-            <a:r>
-              <a:rPr lang="da-DK" sz="2800" b="1">
-                <a:latin typeface="Consolas" panose="020B0609020204030204" pitchFamily="49" charset="0"/>
-              </a:rPr>
-              <a:t> </a:t>
-            </a:r>
-            <a:r>
-              <a:rPr lang="da-DK" sz="2800" b="1" smtClean="0">
-                <a:latin typeface="Consolas" panose="020B0609020204030204" pitchFamily="49" charset="0"/>
-              </a:rPr>
-              <a:t>   </a:t>
-            </a:r>
-            <a:r>
-              <a:rPr lang="da-DK" sz="2800" b="1" smtClean="0">
-                <a:solidFill>
-                  <a:srgbClr val="0070C0"/>
-                </a:solidFill>
-                <a:latin typeface="Consolas" panose="020B0609020204030204" pitchFamily="49" charset="0"/>
-              </a:rPr>
-              <a:t>private string </a:t>
-            </a:r>
-            <a:r>
-              <a:rPr lang="da-DK" sz="2800" b="1" smtClean="0">
-                <a:latin typeface="Consolas" panose="020B0609020204030204" pitchFamily="49" charset="0"/>
-              </a:rPr>
-              <a:t>_licensePlate;</a:t>
-            </a:r>
-          </a:p>
-          <a:p>
-            <a:r>
-              <a:rPr lang="da-DK" sz="2800" b="1">
-                <a:latin typeface="Consolas" panose="020B0609020204030204" pitchFamily="49" charset="0"/>
-              </a:rPr>
-              <a:t> </a:t>
-            </a:r>
-            <a:r>
-              <a:rPr lang="da-DK" sz="2800" b="1" smtClean="0">
-                <a:latin typeface="Consolas" panose="020B0609020204030204" pitchFamily="49" charset="0"/>
-              </a:rPr>
-              <a:t>   </a:t>
-            </a:r>
-            <a:r>
-              <a:rPr lang="da-DK" sz="2800" b="1" smtClean="0">
-                <a:solidFill>
-                  <a:srgbClr val="0070C0"/>
-                </a:solidFill>
-                <a:latin typeface="Consolas" panose="020B0609020204030204" pitchFamily="49" charset="0"/>
-              </a:rPr>
-              <a:t>private int </a:t>
-            </a:r>
-            <a:r>
-              <a:rPr lang="da-DK" sz="2800" b="1" smtClean="0">
-                <a:latin typeface="Consolas" panose="020B0609020204030204" pitchFamily="49" charset="0"/>
-              </a:rPr>
-              <a:t>_price;</a:t>
-            </a:r>
-          </a:p>
-          <a:p>
-            <a:endParaRPr lang="da-DK" sz="2800" b="1">
-              <a:latin typeface="Consolas" panose="020B0609020204030204" pitchFamily="49" charset="0"/>
-            </a:endParaRPr>
-          </a:p>
-          <a:p>
-            <a:r>
-              <a:rPr lang="da-DK" sz="2800" b="1">
-                <a:latin typeface="Consolas" panose="020B0609020204030204" pitchFamily="49" charset="0"/>
-              </a:rPr>
-              <a:t> </a:t>
-            </a:r>
-            <a:r>
-              <a:rPr lang="da-DK" sz="2800" b="1" smtClean="0">
-                <a:latin typeface="Consolas" panose="020B0609020204030204" pitchFamily="49" charset="0"/>
-              </a:rPr>
-              <a:t>   </a:t>
-            </a:r>
-            <a:r>
-              <a:rPr lang="da-DK" sz="2800" b="1" smtClean="0">
-                <a:solidFill>
-                  <a:srgbClr val="0070C0"/>
-                </a:solidFill>
-                <a:latin typeface="Consolas" panose="020B0609020204030204" pitchFamily="49" charset="0"/>
-              </a:rPr>
-              <a:t>private static int </a:t>
-            </a:r>
-            <a:r>
-              <a:rPr lang="da-DK" sz="2800" b="1" smtClean="0">
-                <a:latin typeface="Consolas" panose="020B0609020204030204" pitchFamily="49" charset="0"/>
-              </a:rPr>
-              <a:t>_noOfCarsCreated</a:t>
-            </a:r>
-            <a:r>
-              <a:rPr lang="da-DK" sz="2800" b="1" smtClean="0">
-                <a:solidFill>
-                  <a:srgbClr val="FF0000"/>
-                </a:solidFill>
-                <a:latin typeface="Consolas" panose="020B0609020204030204" pitchFamily="49" charset="0"/>
-              </a:rPr>
-              <a:t> = 0</a:t>
-            </a:r>
-            <a:r>
-              <a:rPr lang="da-DK" sz="2800" b="1" smtClean="0">
-                <a:latin typeface="Consolas" panose="020B0609020204030204" pitchFamily="49" charset="0"/>
-              </a:rPr>
-              <a:t>;</a:t>
-            </a:r>
-          </a:p>
-          <a:p>
-            <a:endParaRPr lang="da-DK" sz="2800" b="1" smtClean="0">
-              <a:latin typeface="Consolas" panose="020B0609020204030204" pitchFamily="49" charset="0"/>
-            </a:endParaRPr>
-          </a:p>
-          <a:p>
-            <a:r>
-              <a:rPr lang="da-DK" sz="2800" b="1" smtClean="0">
-                <a:latin typeface="Consolas" panose="020B0609020204030204" pitchFamily="49" charset="0"/>
-              </a:rPr>
-              <a:t>    …</a:t>
-            </a:r>
-            <a:endParaRPr lang="da-DK" sz="2800" b="1" smtClean="0">
-              <a:latin typeface="Consolas" panose="020B0609020204030204" pitchFamily="49" charset="0"/>
-            </a:endParaRPr>
-          </a:p>
-          <a:p>
-            <a:r>
-              <a:rPr lang="da-DK" sz="2800" b="1" smtClean="0">
-                <a:latin typeface="Consolas" panose="020B0609020204030204" pitchFamily="49" charset="0"/>
-              </a:rPr>
-              <a:t>}</a:t>
-            </a:r>
-            <a:endParaRPr lang="da-DK" sz="2800" b="1" smtClean="0">
+              <a:rPr lang="da-DK" sz="3600" b="1" smtClean="0">
+                <a:latin typeface="Consolas" panose="020B0609020204030204" pitchFamily="49" charset="0"/>
+              </a:rPr>
+              <a:t>_noOfCarsCreated = 0</a:t>
+            </a:r>
+            <a:endParaRPr lang="da-DK" sz="3600" b="1">
               <a:latin typeface="Consolas" panose="020B0609020204030204" pitchFamily="49" charset="0"/>
             </a:endParaRPr>
           </a:p>
@@ -4119,7 +4192,7 @@
     </p:spTree>
     <p:extLst>
       <p:ext uri="{BB962C8B-B14F-4D97-AF65-F5344CB8AC3E}">
-        <p14:creationId xmlns:p14="http://schemas.microsoft.com/office/powerpoint/2010/main" val="2174583888"/>
+        <p14:creationId xmlns:p14="http://schemas.microsoft.com/office/powerpoint/2010/main" val="3447998874"/>
       </p:ext>
     </p:extLst>
   </p:cSld>
@@ -4128,14 +4201,10 @@
   </p:clrMapOvr>
   <mc:AlternateContent xmlns:mc="http://schemas.openxmlformats.org/markup-compatibility/2006">
     <mc:Choice xmlns:p14="http://schemas.microsoft.com/office/powerpoint/2010/main" Requires="p14">
-      <p:transition spd="med" p14:dur="700">
-        <p:fade/>
-      </p:transition>
+      <p:transition p14:dur="0"/>
     </mc:Choice>
     <mc:Fallback>
-      <p:transition spd="med">
-        <p:fade/>
-      </p:transition>
+      <p:transition/>
     </mc:Fallback>
   </mc:AlternateContent>
   <p:timing>
@@ -4167,14 +4236,14 @@
       </p:grpSpPr>
       <p:sp>
         <p:nvSpPr>
-          <p:cNvPr id="2" name="Tekstfelt 1"/>
+          <p:cNvPr id="5" name="Tekstfelt 4"/>
           <p:cNvSpPr txBox="1"/>
           <p:nvPr/>
         </p:nvSpPr>
         <p:spPr>
           <a:xfrm>
-            <a:off x="920415" y="672345"/>
-            <a:ext cx="10485521" cy="1815882"/>
+            <a:off x="718169" y="452788"/>
+            <a:ext cx="6069130" cy="646331"/>
           </a:xfrm>
           <a:prstGeom prst="rect">
             <a:avLst/>
@@ -4188,85 +4257,84 @@
           <a:lstStyle/>
           <a:p>
             <a:r>
-              <a:rPr lang="da-DK" sz="2800" b="1" smtClean="0">
-                <a:solidFill>
-                  <a:srgbClr val="0070C0"/>
-                </a:solidFill>
-                <a:latin typeface="Consolas" panose="020B0609020204030204" pitchFamily="49" charset="0"/>
-              </a:rPr>
-              <a:t>static </a:t>
-            </a:r>
-            <a:r>
-              <a:rPr lang="da-DK" sz="2800" b="1" smtClean="0">
-                <a:latin typeface="Consolas" panose="020B0609020204030204" pitchFamily="49" charset="0"/>
-              </a:rPr>
-              <a:t>Car</a:t>
-            </a:r>
-            <a:r>
-              <a:rPr lang="da-DK" sz="2800" b="1" smtClean="0">
-                <a:latin typeface="Consolas" panose="020B0609020204030204" pitchFamily="49" charset="0"/>
-              </a:rPr>
-              <a:t>()</a:t>
-            </a:r>
-            <a:endParaRPr lang="da-DK" sz="2800" b="1">
+              <a:rPr lang="da-DK" sz="3600" b="1" smtClean="0">
+                <a:latin typeface="Consolas" panose="020B0609020204030204" pitchFamily="49" charset="0"/>
+              </a:rPr>
+              <a:t>_noOfCarsCreated = 1</a:t>
+            </a:r>
+            <a:endParaRPr lang="da-DK" sz="3600" b="1">
               <a:latin typeface="Consolas" panose="020B0609020204030204" pitchFamily="49" charset="0"/>
             </a:endParaRPr>
           </a:p>
-          <a:p>
-            <a:r>
-              <a:rPr lang="da-DK" sz="2800" b="1" smtClean="0">
-                <a:latin typeface="Consolas" panose="020B0609020204030204" pitchFamily="49" charset="0"/>
-              </a:rPr>
-              <a:t>{</a:t>
-            </a:r>
-          </a:p>
-          <a:p>
-            <a:r>
-              <a:rPr lang="da-DK" sz="2800" b="1">
-                <a:latin typeface="Consolas" panose="020B0609020204030204" pitchFamily="49" charset="0"/>
-              </a:rPr>
-              <a:t> </a:t>
-            </a:r>
-            <a:r>
-              <a:rPr lang="da-DK" sz="2800" b="1" smtClean="0">
-                <a:latin typeface="Consolas" panose="020B0609020204030204" pitchFamily="49" charset="0"/>
-              </a:rPr>
-              <a:t>   _noOfCarsCreated = 0;</a:t>
-            </a:r>
-            <a:endParaRPr lang="da-DK" sz="2800" b="1" smtClean="0">
-              <a:latin typeface="Consolas" panose="020B0609020204030204" pitchFamily="49" charset="0"/>
-            </a:endParaRPr>
-          </a:p>
-          <a:p>
-            <a:r>
-              <a:rPr lang="da-DK" sz="2800" b="1" smtClean="0">
-                <a:latin typeface="Consolas" panose="020B0609020204030204" pitchFamily="49" charset="0"/>
-              </a:rPr>
-              <a:t>}</a:t>
-            </a:r>
-            <a:endParaRPr lang="da-DK" sz="2800" b="1" smtClean="0">
-              <a:latin typeface="Consolas" panose="020B0609020204030204" pitchFamily="49" charset="0"/>
-            </a:endParaRPr>
+        </p:txBody>
+      </p:sp>
+      <p:sp>
+        <p:nvSpPr>
+          <p:cNvPr id="7" name="Sky 6"/>
+          <p:cNvSpPr/>
+          <p:nvPr/>
+        </p:nvSpPr>
+        <p:spPr>
+          <a:xfrm>
+            <a:off x="718169" y="3804794"/>
+            <a:ext cx="3582248" cy="2375829"/>
+          </a:xfrm>
+          <a:prstGeom prst="cloud">
+            <a:avLst/>
+          </a:prstGeom>
+        </p:spPr>
+        <p:style>
+          <a:lnRef idx="2">
+            <a:schemeClr val="accent1">
+              <a:shade val="50000"/>
+            </a:schemeClr>
+          </a:lnRef>
+          <a:fillRef idx="1">
+            <a:schemeClr val="accent1"/>
+          </a:fillRef>
+          <a:effectRef idx="0">
+            <a:schemeClr val="accent1"/>
+          </a:effectRef>
+          <a:fontRef idx="minor">
+            <a:schemeClr val="lt1"/>
+          </a:fontRef>
+        </p:style>
+        <p:txBody>
+          <a:bodyPr rtlCol="0" anchor="ctr"/>
+          <a:lstStyle/>
+          <a:p>
+            <a:r>
+              <a:rPr lang="da-DK" sz="2800" smtClean="0"/>
+              <a:t>_licensePlate</a:t>
+            </a:r>
+            <a:endParaRPr lang="da-DK" sz="2800" smtClean="0"/>
+          </a:p>
+          <a:p>
+            <a:r>
+              <a:rPr lang="da-DK" sz="2800" smtClean="0"/>
+              <a:t>_price</a:t>
+            </a:r>
+            <a:endParaRPr lang="da-DK" sz="2800"/>
           </a:p>
         </p:txBody>
       </p:sp>
     </p:spTree>
     <p:extLst>
       <p:ext uri="{BB962C8B-B14F-4D97-AF65-F5344CB8AC3E}">
-        <p14:creationId xmlns:p14="http://schemas.microsoft.com/office/powerpoint/2010/main" val="1879831211"/>
+        <p14:creationId xmlns:p14="http://schemas.microsoft.com/office/powerpoint/2010/main" val="3724775609"/>
       </p:ext>
     </p:extLst>
   </p:cSld>
   <p:clrMapOvr>
     <a:masterClrMapping/>
   </p:clrMapOvr>
-  <mc:AlternateContent xmlns:mc="http://schemas.openxmlformats.org/markup-compatibility/2006">
-    <mc:Choice xmlns:p14="http://schemas.microsoft.com/office/powerpoint/2010/main" Requires="p14">
+  <mc:AlternateContent xmlns:mc="http://schemas.openxmlformats.org/markup-compatibility/2006" xmlns:p14="http://schemas.microsoft.com/office/powerpoint/2010/main">
+    <mc:Choice Requires="p14">
       <p:transition spd="med" p14:dur="700">
         <p:fade/>
       </p:transition>
     </mc:Choice>
-    <mc:Fallback>
+    <mc:Fallback xmlns="">
       <p:transition spd="med">
         <p:fade/>
       </p:transition>
@@ -4301,6 +4369,1055 @@
       </p:grpSpPr>
       <p:sp>
         <p:nvSpPr>
+          <p:cNvPr id="4" name="Sky 3"/>
+          <p:cNvSpPr/>
+          <p:nvPr/>
+        </p:nvSpPr>
+        <p:spPr>
+          <a:xfrm>
+            <a:off x="4013691" y="1622284"/>
+            <a:ext cx="3582248" cy="2375829"/>
+          </a:xfrm>
+          <a:prstGeom prst="cloud">
+            <a:avLst/>
+          </a:prstGeom>
+        </p:spPr>
+        <p:style>
+          <a:lnRef idx="2">
+            <a:schemeClr val="accent1">
+              <a:shade val="50000"/>
+            </a:schemeClr>
+          </a:lnRef>
+          <a:fillRef idx="1">
+            <a:schemeClr val="accent1"/>
+          </a:fillRef>
+          <a:effectRef idx="0">
+            <a:schemeClr val="accent1"/>
+          </a:effectRef>
+          <a:fontRef idx="minor">
+            <a:schemeClr val="lt1"/>
+          </a:fontRef>
+        </p:style>
+        <p:txBody>
+          <a:bodyPr rtlCol="0" anchor="ctr"/>
+          <a:lstStyle/>
+          <a:p>
+            <a:r>
+              <a:rPr lang="da-DK" sz="2800" smtClean="0"/>
+              <a:t>_licensePlate</a:t>
+            </a:r>
+            <a:endParaRPr lang="da-DK" sz="2800" smtClean="0"/>
+          </a:p>
+          <a:p>
+            <a:r>
+              <a:rPr lang="da-DK" sz="2800" smtClean="0"/>
+              <a:t>_price</a:t>
+            </a:r>
+            <a:endParaRPr lang="da-DK" sz="2800"/>
+          </a:p>
+        </p:txBody>
+      </p:sp>
+      <p:sp>
+        <p:nvSpPr>
+          <p:cNvPr id="5" name="Tekstfelt 4"/>
+          <p:cNvSpPr txBox="1"/>
+          <p:nvPr/>
+        </p:nvSpPr>
+        <p:spPr>
+          <a:xfrm>
+            <a:off x="718169" y="452788"/>
+            <a:ext cx="6069130" cy="646331"/>
+          </a:xfrm>
+          <a:prstGeom prst="rect">
+            <a:avLst/>
+          </a:prstGeom>
+          <a:noFill/>
+        </p:spPr>
+        <p:txBody>
+          <a:bodyPr wrap="square" rtlCol="0">
+            <a:spAutoFit/>
+          </a:bodyPr>
+          <a:lstStyle/>
+          <a:p>
+            <a:r>
+              <a:rPr lang="da-DK" sz="3600" b="1" smtClean="0">
+                <a:latin typeface="Consolas" panose="020B0609020204030204" pitchFamily="49" charset="0"/>
+              </a:rPr>
+              <a:t>_noOfCarsCreated = 2</a:t>
+            </a:r>
+            <a:endParaRPr lang="da-DK" sz="3600" b="1">
+              <a:latin typeface="Consolas" panose="020B0609020204030204" pitchFamily="49" charset="0"/>
+            </a:endParaRPr>
+          </a:p>
+        </p:txBody>
+      </p:sp>
+      <p:sp>
+        <p:nvSpPr>
+          <p:cNvPr id="7" name="Sky 6"/>
+          <p:cNvSpPr/>
+          <p:nvPr/>
+        </p:nvSpPr>
+        <p:spPr>
+          <a:xfrm>
+            <a:off x="718169" y="3804794"/>
+            <a:ext cx="3582248" cy="2375829"/>
+          </a:xfrm>
+          <a:prstGeom prst="cloud">
+            <a:avLst/>
+          </a:prstGeom>
+        </p:spPr>
+        <p:style>
+          <a:lnRef idx="2">
+            <a:schemeClr val="accent1">
+              <a:shade val="50000"/>
+            </a:schemeClr>
+          </a:lnRef>
+          <a:fillRef idx="1">
+            <a:schemeClr val="accent1"/>
+          </a:fillRef>
+          <a:effectRef idx="0">
+            <a:schemeClr val="accent1"/>
+          </a:effectRef>
+          <a:fontRef idx="minor">
+            <a:schemeClr val="lt1"/>
+          </a:fontRef>
+        </p:style>
+        <p:txBody>
+          <a:bodyPr rtlCol="0" anchor="ctr"/>
+          <a:lstStyle/>
+          <a:p>
+            <a:r>
+              <a:rPr lang="da-DK" sz="2800" smtClean="0"/>
+              <a:t>_licensePlate</a:t>
+            </a:r>
+            <a:endParaRPr lang="da-DK" sz="2800" smtClean="0"/>
+          </a:p>
+          <a:p>
+            <a:r>
+              <a:rPr lang="da-DK" sz="2800" smtClean="0"/>
+              <a:t>_price</a:t>
+            </a:r>
+            <a:endParaRPr lang="da-DK" sz="2800"/>
+          </a:p>
+        </p:txBody>
+      </p:sp>
+    </p:spTree>
+    <p:extLst>
+      <p:ext uri="{BB962C8B-B14F-4D97-AF65-F5344CB8AC3E}">
+        <p14:creationId xmlns:p14="http://schemas.microsoft.com/office/powerpoint/2010/main" val="3681667"/>
+      </p:ext>
+    </p:extLst>
+  </p:cSld>
+  <p:clrMapOvr>
+    <a:masterClrMapping/>
+  </p:clrMapOvr>
+  <mc:AlternateContent xmlns:mc="http://schemas.openxmlformats.org/markup-compatibility/2006" xmlns:p14="http://schemas.microsoft.com/office/powerpoint/2010/main">
+    <mc:Choice Requires="p14">
+      <p:transition spd="med" p14:dur="700">
+        <p:fade/>
+      </p:transition>
+    </mc:Choice>
+    <mc:Fallback xmlns="">
+      <p:transition spd="med">
+        <p:fade/>
+      </p:transition>
+    </mc:Fallback>
+  </mc:AlternateContent>
+  <p:timing>
+    <p:tnLst>
+      <p:par>
+        <p:cTn id="1" dur="indefinite" restart="never" nodeType="tmRoot"/>
+      </p:par>
+    </p:tnLst>
+  </p:timing>
+</p:sld>
+</file>
+
+<file path=ppt/slides/slide17.xml><?xml version="1.0" encoding="utf-8"?>
+<p:sld xmlns:a="http://schemas.openxmlformats.org/drawingml/2006/main" xmlns:r="http://schemas.openxmlformats.org/officeDocument/2006/relationships" xmlns:p="http://schemas.openxmlformats.org/presentationml/2006/main">
+  <p:cSld>
+    <p:spTree>
+      <p:nvGrpSpPr>
+        <p:cNvPr id="1" name=""/>
+        <p:cNvGrpSpPr/>
+        <p:nvPr/>
+      </p:nvGrpSpPr>
+      <p:grpSpPr>
+        <a:xfrm>
+          <a:off x="0" y="0"/>
+          <a:ext cx="0" cy="0"/>
+          <a:chOff x="0" y="0"/>
+          <a:chExt cx="0" cy="0"/>
+        </a:xfrm>
+      </p:grpSpPr>
+      <p:sp>
+        <p:nvSpPr>
+          <p:cNvPr id="4" name="Sky 3"/>
+          <p:cNvSpPr/>
+          <p:nvPr/>
+        </p:nvSpPr>
+        <p:spPr>
+          <a:xfrm>
+            <a:off x="4013691" y="1622284"/>
+            <a:ext cx="3582248" cy="2375829"/>
+          </a:xfrm>
+          <a:prstGeom prst="cloud">
+            <a:avLst/>
+          </a:prstGeom>
+        </p:spPr>
+        <p:style>
+          <a:lnRef idx="2">
+            <a:schemeClr val="accent1">
+              <a:shade val="50000"/>
+            </a:schemeClr>
+          </a:lnRef>
+          <a:fillRef idx="1">
+            <a:schemeClr val="accent1"/>
+          </a:fillRef>
+          <a:effectRef idx="0">
+            <a:schemeClr val="accent1"/>
+          </a:effectRef>
+          <a:fontRef idx="minor">
+            <a:schemeClr val="lt1"/>
+          </a:fontRef>
+        </p:style>
+        <p:txBody>
+          <a:bodyPr rtlCol="0" anchor="ctr"/>
+          <a:lstStyle/>
+          <a:p>
+            <a:r>
+              <a:rPr lang="da-DK" sz="2800" smtClean="0"/>
+              <a:t>_licensePlate</a:t>
+            </a:r>
+            <a:endParaRPr lang="da-DK" sz="2800" smtClean="0"/>
+          </a:p>
+          <a:p>
+            <a:r>
+              <a:rPr lang="da-DK" sz="2800" smtClean="0"/>
+              <a:t>_price</a:t>
+            </a:r>
+            <a:endParaRPr lang="da-DK" sz="2800"/>
+          </a:p>
+        </p:txBody>
+      </p:sp>
+      <p:sp>
+        <p:nvSpPr>
+          <p:cNvPr id="5" name="Tekstfelt 4"/>
+          <p:cNvSpPr txBox="1"/>
+          <p:nvPr/>
+        </p:nvSpPr>
+        <p:spPr>
+          <a:xfrm>
+            <a:off x="718169" y="452788"/>
+            <a:ext cx="6069130" cy="646331"/>
+          </a:xfrm>
+          <a:prstGeom prst="rect">
+            <a:avLst/>
+          </a:prstGeom>
+          <a:noFill/>
+        </p:spPr>
+        <p:txBody>
+          <a:bodyPr wrap="square" rtlCol="0">
+            <a:spAutoFit/>
+          </a:bodyPr>
+          <a:lstStyle/>
+          <a:p>
+            <a:r>
+              <a:rPr lang="da-DK" sz="3600" b="1" smtClean="0">
+                <a:latin typeface="Consolas" panose="020B0609020204030204" pitchFamily="49" charset="0"/>
+              </a:rPr>
+              <a:t>_noOfCarsCreated = 3</a:t>
+            </a:r>
+            <a:endParaRPr lang="da-DK" sz="3600" b="1">
+              <a:latin typeface="Consolas" panose="020B0609020204030204" pitchFamily="49" charset="0"/>
+            </a:endParaRPr>
+          </a:p>
+        </p:txBody>
+      </p:sp>
+      <p:sp>
+        <p:nvSpPr>
+          <p:cNvPr id="6" name="Sky 5"/>
+          <p:cNvSpPr/>
+          <p:nvPr/>
+        </p:nvSpPr>
+        <p:spPr>
+          <a:xfrm>
+            <a:off x="7984111" y="3150677"/>
+            <a:ext cx="3582248" cy="2375829"/>
+          </a:xfrm>
+          <a:prstGeom prst="cloud">
+            <a:avLst/>
+          </a:prstGeom>
+        </p:spPr>
+        <p:style>
+          <a:lnRef idx="2">
+            <a:schemeClr val="accent1">
+              <a:shade val="50000"/>
+            </a:schemeClr>
+          </a:lnRef>
+          <a:fillRef idx="1">
+            <a:schemeClr val="accent1"/>
+          </a:fillRef>
+          <a:effectRef idx="0">
+            <a:schemeClr val="accent1"/>
+          </a:effectRef>
+          <a:fontRef idx="minor">
+            <a:schemeClr val="lt1"/>
+          </a:fontRef>
+        </p:style>
+        <p:txBody>
+          <a:bodyPr rtlCol="0" anchor="ctr"/>
+          <a:lstStyle/>
+          <a:p>
+            <a:r>
+              <a:rPr lang="da-DK" sz="2800" smtClean="0"/>
+              <a:t>_licensePlate</a:t>
+            </a:r>
+            <a:endParaRPr lang="da-DK" sz="2800" smtClean="0"/>
+          </a:p>
+          <a:p>
+            <a:r>
+              <a:rPr lang="da-DK" sz="2800" smtClean="0"/>
+              <a:t>_price</a:t>
+            </a:r>
+            <a:endParaRPr lang="da-DK" sz="2800"/>
+          </a:p>
+        </p:txBody>
+      </p:sp>
+      <p:sp>
+        <p:nvSpPr>
+          <p:cNvPr id="7" name="Sky 6"/>
+          <p:cNvSpPr/>
+          <p:nvPr/>
+        </p:nvSpPr>
+        <p:spPr>
+          <a:xfrm>
+            <a:off x="718169" y="3804794"/>
+            <a:ext cx="3582248" cy="2375829"/>
+          </a:xfrm>
+          <a:prstGeom prst="cloud">
+            <a:avLst/>
+          </a:prstGeom>
+        </p:spPr>
+        <p:style>
+          <a:lnRef idx="2">
+            <a:schemeClr val="accent1">
+              <a:shade val="50000"/>
+            </a:schemeClr>
+          </a:lnRef>
+          <a:fillRef idx="1">
+            <a:schemeClr val="accent1"/>
+          </a:fillRef>
+          <a:effectRef idx="0">
+            <a:schemeClr val="accent1"/>
+          </a:effectRef>
+          <a:fontRef idx="minor">
+            <a:schemeClr val="lt1"/>
+          </a:fontRef>
+        </p:style>
+        <p:txBody>
+          <a:bodyPr rtlCol="0" anchor="ctr"/>
+          <a:lstStyle/>
+          <a:p>
+            <a:r>
+              <a:rPr lang="da-DK" sz="2800" smtClean="0"/>
+              <a:t>_licensePlate</a:t>
+            </a:r>
+            <a:endParaRPr lang="da-DK" sz="2800" smtClean="0"/>
+          </a:p>
+          <a:p>
+            <a:r>
+              <a:rPr lang="da-DK" sz="2800" smtClean="0"/>
+              <a:t>_price</a:t>
+            </a:r>
+            <a:endParaRPr lang="da-DK" sz="2800"/>
+          </a:p>
+        </p:txBody>
+      </p:sp>
+    </p:spTree>
+    <p:extLst>
+      <p:ext uri="{BB962C8B-B14F-4D97-AF65-F5344CB8AC3E}">
+        <p14:creationId xmlns:p14="http://schemas.microsoft.com/office/powerpoint/2010/main" val="954261354"/>
+      </p:ext>
+    </p:extLst>
+  </p:cSld>
+  <p:clrMapOvr>
+    <a:masterClrMapping/>
+  </p:clrMapOvr>
+  <mc:AlternateContent xmlns:mc="http://schemas.openxmlformats.org/markup-compatibility/2006" xmlns:p14="http://schemas.microsoft.com/office/powerpoint/2010/main">
+    <mc:Choice Requires="p14">
+      <p:transition spd="med" p14:dur="700">
+        <p:fade/>
+      </p:transition>
+    </mc:Choice>
+    <mc:Fallback xmlns="">
+      <p:transition spd="med">
+        <p:fade/>
+      </p:transition>
+    </mc:Fallback>
+  </mc:AlternateContent>
+  <p:timing>
+    <p:tnLst>
+      <p:par>
+        <p:cTn id="1" dur="indefinite" restart="never" nodeType="tmRoot"/>
+      </p:par>
+    </p:tnLst>
+  </p:timing>
+</p:sld>
+</file>
+
+<file path=ppt/slides/slide18.xml><?xml version="1.0" encoding="utf-8"?>
+<p:sld xmlns:a="http://schemas.openxmlformats.org/drawingml/2006/main" xmlns:r="http://schemas.openxmlformats.org/officeDocument/2006/relationships" xmlns:p="http://schemas.openxmlformats.org/presentationml/2006/main">
+  <p:cSld>
+    <p:spTree>
+      <p:nvGrpSpPr>
+        <p:cNvPr id="1" name=""/>
+        <p:cNvGrpSpPr/>
+        <p:nvPr/>
+      </p:nvGrpSpPr>
+      <p:grpSpPr>
+        <a:xfrm>
+          <a:off x="0" y="0"/>
+          <a:ext cx="0" cy="0"/>
+          <a:chOff x="0" y="0"/>
+          <a:chExt cx="0" cy="0"/>
+        </a:xfrm>
+      </p:grpSpPr>
+      <p:sp>
+        <p:nvSpPr>
+          <p:cNvPr id="2" name="Tekstfelt 1"/>
+          <p:cNvSpPr txBox="1"/>
+          <p:nvPr/>
+        </p:nvSpPr>
+        <p:spPr>
+          <a:xfrm>
+            <a:off x="920415" y="672345"/>
+            <a:ext cx="10485521" cy="1815882"/>
+          </a:xfrm>
+          <a:prstGeom prst="rect">
+            <a:avLst/>
+          </a:prstGeom>
+          <a:noFill/>
+        </p:spPr>
+        <p:txBody>
+          <a:bodyPr wrap="square" rtlCol="0">
+            <a:spAutoFit/>
+          </a:bodyPr>
+          <a:lstStyle/>
+          <a:p>
+            <a:r>
+              <a:rPr lang="da-DK" sz="2800" b="1" smtClean="0">
+                <a:solidFill>
+                  <a:srgbClr val="0070C0"/>
+                </a:solidFill>
+                <a:latin typeface="Consolas" panose="020B0609020204030204" pitchFamily="49" charset="0"/>
+              </a:rPr>
+              <a:t>public static int</a:t>
+            </a:r>
+            <a:r>
+              <a:rPr lang="da-DK" sz="2800" b="1" smtClean="0">
+                <a:latin typeface="Consolas" panose="020B0609020204030204" pitchFamily="49" charset="0"/>
+              </a:rPr>
+              <a:t> NoOfCarsCreated</a:t>
+            </a:r>
+          </a:p>
+          <a:p>
+            <a:r>
+              <a:rPr lang="da-DK" sz="2800" b="1" smtClean="0">
+                <a:latin typeface="Consolas" panose="020B0609020204030204" pitchFamily="49" charset="0"/>
+              </a:rPr>
+              <a:t>{</a:t>
+            </a:r>
+          </a:p>
+          <a:p>
+            <a:r>
+              <a:rPr lang="da-DK" sz="2800" b="1">
+                <a:latin typeface="Consolas" panose="020B0609020204030204" pitchFamily="49" charset="0"/>
+              </a:rPr>
+              <a:t> </a:t>
+            </a:r>
+            <a:r>
+              <a:rPr lang="da-DK" sz="2800" b="1" smtClean="0">
+                <a:latin typeface="Consolas" panose="020B0609020204030204" pitchFamily="49" charset="0"/>
+              </a:rPr>
+              <a:t>   </a:t>
+            </a:r>
+            <a:r>
+              <a:rPr lang="da-DK" sz="2800" b="1" smtClean="0">
+                <a:solidFill>
+                  <a:srgbClr val="0070C0"/>
+                </a:solidFill>
+                <a:latin typeface="Consolas" panose="020B0609020204030204" pitchFamily="49" charset="0"/>
+              </a:rPr>
+              <a:t>get </a:t>
+            </a:r>
+            <a:r>
+              <a:rPr lang="da-DK" sz="2800" b="1" smtClean="0">
+                <a:latin typeface="Consolas" panose="020B0609020204030204" pitchFamily="49" charset="0"/>
+              </a:rPr>
+              <a:t>{ </a:t>
+            </a:r>
+            <a:r>
+              <a:rPr lang="da-DK" sz="2800" b="1">
+                <a:solidFill>
+                  <a:srgbClr val="0070C0"/>
+                </a:solidFill>
+                <a:latin typeface="Consolas" panose="020B0609020204030204" pitchFamily="49" charset="0"/>
+              </a:rPr>
+              <a:t>return</a:t>
+            </a:r>
+            <a:r>
+              <a:rPr lang="da-DK" sz="2800" b="1" smtClean="0">
+                <a:latin typeface="Consolas" panose="020B0609020204030204" pitchFamily="49" charset="0"/>
+              </a:rPr>
+              <a:t> </a:t>
+            </a:r>
+            <a:r>
+              <a:rPr lang="en-US" sz="2800" b="1" smtClean="0">
+                <a:latin typeface="Consolas" panose="020B0609020204030204" pitchFamily="49" charset="0"/>
+              </a:rPr>
+              <a:t>_noOfCarsCreated;</a:t>
+            </a:r>
+            <a:r>
+              <a:rPr lang="da-DK" sz="2800" b="1" smtClean="0">
+                <a:latin typeface="Consolas" panose="020B0609020204030204" pitchFamily="49" charset="0"/>
+              </a:rPr>
+              <a:t> }</a:t>
+            </a:r>
+          </a:p>
+          <a:p>
+            <a:r>
+              <a:rPr lang="da-DK" sz="2800" b="1" smtClean="0">
+                <a:latin typeface="Consolas" panose="020B0609020204030204" pitchFamily="49" charset="0"/>
+              </a:rPr>
+              <a:t>}</a:t>
+            </a:r>
+          </a:p>
+        </p:txBody>
+      </p:sp>
+    </p:spTree>
+    <p:extLst>
+      <p:ext uri="{BB962C8B-B14F-4D97-AF65-F5344CB8AC3E}">
+        <p14:creationId xmlns:p14="http://schemas.microsoft.com/office/powerpoint/2010/main" val="1801519129"/>
+      </p:ext>
+    </p:extLst>
+  </p:cSld>
+  <p:clrMapOvr>
+    <a:masterClrMapping/>
+  </p:clrMapOvr>
+  <mc:AlternateContent xmlns:mc="http://schemas.openxmlformats.org/markup-compatibility/2006">
+    <mc:Choice xmlns:p14="http://schemas.microsoft.com/office/powerpoint/2010/main" Requires="p14">
+      <p:transition p14:dur="0"/>
+    </mc:Choice>
+    <mc:Fallback>
+      <p:transition/>
+    </mc:Fallback>
+  </mc:AlternateContent>
+  <p:timing>
+    <p:tnLst>
+      <p:par>
+        <p:cTn id="1" dur="indefinite" restart="never" nodeType="tmRoot"/>
+      </p:par>
+    </p:tnLst>
+  </p:timing>
+</p:sld>
+</file>
+
+<file path=ppt/slides/slide19.xml><?xml version="1.0" encoding="utf-8"?>
+<p:sld xmlns:a="http://schemas.openxmlformats.org/drawingml/2006/main" xmlns:r="http://schemas.openxmlformats.org/officeDocument/2006/relationships" xmlns:p="http://schemas.openxmlformats.org/presentationml/2006/main">
+  <p:cSld>
+    <p:spTree>
+      <p:nvGrpSpPr>
+        <p:cNvPr id="1" name=""/>
+        <p:cNvGrpSpPr/>
+        <p:nvPr/>
+      </p:nvGrpSpPr>
+      <p:grpSpPr>
+        <a:xfrm>
+          <a:off x="0" y="0"/>
+          <a:ext cx="0" cy="0"/>
+          <a:chOff x="0" y="0"/>
+          <a:chExt cx="0" cy="0"/>
+        </a:xfrm>
+      </p:grpSpPr>
+      <p:sp>
+        <p:nvSpPr>
+          <p:cNvPr id="2" name="Tekstfelt 1"/>
+          <p:cNvSpPr txBox="1"/>
+          <p:nvPr/>
+        </p:nvSpPr>
+        <p:spPr>
+          <a:xfrm>
+            <a:off x="900096" y="685892"/>
+            <a:ext cx="10214944" cy="3970318"/>
+          </a:xfrm>
+          <a:prstGeom prst="rect">
+            <a:avLst/>
+          </a:prstGeom>
+          <a:noFill/>
+        </p:spPr>
+        <p:txBody>
+          <a:bodyPr wrap="square" rtlCol="0">
+            <a:spAutoFit/>
+          </a:bodyPr>
+          <a:lstStyle/>
+          <a:p>
+            <a:r>
+              <a:rPr lang="da-DK" sz="2800" b="1" smtClean="0">
+                <a:solidFill>
+                  <a:srgbClr val="0070C0"/>
+                </a:solidFill>
+                <a:latin typeface="Consolas" panose="020B0609020204030204" pitchFamily="49" charset="0"/>
+              </a:rPr>
+              <a:t>public class</a:t>
+            </a:r>
+            <a:r>
+              <a:rPr lang="da-DK" sz="2800" b="1" smtClean="0">
+                <a:latin typeface="Consolas" panose="020B0609020204030204" pitchFamily="49" charset="0"/>
+              </a:rPr>
+              <a:t> </a:t>
+            </a:r>
+            <a:r>
+              <a:rPr lang="da-DK" sz="2800" b="1" smtClean="0">
+                <a:solidFill>
+                  <a:schemeClr val="accent6">
+                    <a:lumMod val="75000"/>
+                  </a:schemeClr>
+                </a:solidFill>
+                <a:latin typeface="Consolas" panose="020B0609020204030204" pitchFamily="49" charset="0"/>
+              </a:rPr>
+              <a:t>Car</a:t>
+            </a:r>
+          </a:p>
+          <a:p>
+            <a:r>
+              <a:rPr lang="da-DK" sz="2800" b="1" smtClean="0">
+                <a:latin typeface="Consolas" panose="020B0609020204030204" pitchFamily="49" charset="0"/>
+              </a:rPr>
+              <a:t>{</a:t>
+            </a:r>
+          </a:p>
+          <a:p>
+            <a:r>
+              <a:rPr lang="da-DK" sz="2800" b="1">
+                <a:latin typeface="Consolas" panose="020B0609020204030204" pitchFamily="49" charset="0"/>
+              </a:rPr>
+              <a:t> </a:t>
+            </a:r>
+            <a:r>
+              <a:rPr lang="da-DK" sz="2800" b="1" smtClean="0">
+                <a:latin typeface="Consolas" panose="020B0609020204030204" pitchFamily="49" charset="0"/>
+              </a:rPr>
+              <a:t>   </a:t>
+            </a:r>
+            <a:r>
+              <a:rPr lang="da-DK" sz="2800" b="1" smtClean="0">
+                <a:solidFill>
+                  <a:srgbClr val="0070C0"/>
+                </a:solidFill>
+                <a:latin typeface="Consolas" panose="020B0609020204030204" pitchFamily="49" charset="0"/>
+              </a:rPr>
+              <a:t>private string </a:t>
+            </a:r>
+            <a:r>
+              <a:rPr lang="da-DK" sz="2800" b="1" smtClean="0">
+                <a:latin typeface="Consolas" panose="020B0609020204030204" pitchFamily="49" charset="0"/>
+              </a:rPr>
+              <a:t>_licensePlate;</a:t>
+            </a:r>
+          </a:p>
+          <a:p>
+            <a:r>
+              <a:rPr lang="da-DK" sz="2800" b="1">
+                <a:latin typeface="Consolas" panose="020B0609020204030204" pitchFamily="49" charset="0"/>
+              </a:rPr>
+              <a:t> </a:t>
+            </a:r>
+            <a:r>
+              <a:rPr lang="da-DK" sz="2800" b="1" smtClean="0">
+                <a:latin typeface="Consolas" panose="020B0609020204030204" pitchFamily="49" charset="0"/>
+              </a:rPr>
+              <a:t>   </a:t>
+            </a:r>
+            <a:r>
+              <a:rPr lang="da-DK" sz="2800" b="1" smtClean="0">
+                <a:solidFill>
+                  <a:srgbClr val="0070C0"/>
+                </a:solidFill>
+                <a:latin typeface="Consolas" panose="020B0609020204030204" pitchFamily="49" charset="0"/>
+              </a:rPr>
+              <a:t>private int </a:t>
+            </a:r>
+            <a:r>
+              <a:rPr lang="da-DK" sz="2800" b="1" smtClean="0">
+                <a:latin typeface="Consolas" panose="020B0609020204030204" pitchFamily="49" charset="0"/>
+              </a:rPr>
+              <a:t>_price;</a:t>
+            </a:r>
+          </a:p>
+          <a:p>
+            <a:endParaRPr lang="da-DK" sz="2800" b="1">
+              <a:latin typeface="Consolas" panose="020B0609020204030204" pitchFamily="49" charset="0"/>
+            </a:endParaRPr>
+          </a:p>
+          <a:p>
+            <a:r>
+              <a:rPr lang="da-DK" sz="2800" b="1">
+                <a:latin typeface="Consolas" panose="020B0609020204030204" pitchFamily="49" charset="0"/>
+              </a:rPr>
+              <a:t> </a:t>
+            </a:r>
+            <a:r>
+              <a:rPr lang="da-DK" sz="2800" b="1" smtClean="0">
+                <a:latin typeface="Consolas" panose="020B0609020204030204" pitchFamily="49" charset="0"/>
+              </a:rPr>
+              <a:t>   </a:t>
+            </a:r>
+            <a:r>
+              <a:rPr lang="da-DK" sz="2800" b="1" smtClean="0">
+                <a:solidFill>
+                  <a:srgbClr val="0070C0"/>
+                </a:solidFill>
+                <a:latin typeface="Consolas" panose="020B0609020204030204" pitchFamily="49" charset="0"/>
+              </a:rPr>
+              <a:t>private static int </a:t>
+            </a:r>
+            <a:r>
+              <a:rPr lang="da-DK" sz="2800" b="1" smtClean="0">
+                <a:latin typeface="Consolas" panose="020B0609020204030204" pitchFamily="49" charset="0"/>
+              </a:rPr>
+              <a:t>_noOfCarsCreated</a:t>
+            </a:r>
+            <a:r>
+              <a:rPr lang="da-DK" sz="2800" b="1" smtClean="0">
+                <a:solidFill>
+                  <a:srgbClr val="FF0000"/>
+                </a:solidFill>
+                <a:latin typeface="Consolas" panose="020B0609020204030204" pitchFamily="49" charset="0"/>
+              </a:rPr>
+              <a:t> = 0</a:t>
+            </a:r>
+            <a:r>
+              <a:rPr lang="da-DK" sz="2800" b="1" smtClean="0">
+                <a:latin typeface="Consolas" panose="020B0609020204030204" pitchFamily="49" charset="0"/>
+              </a:rPr>
+              <a:t>;</a:t>
+            </a:r>
+          </a:p>
+          <a:p>
+            <a:endParaRPr lang="da-DK" sz="2800" b="1" smtClean="0">
+              <a:latin typeface="Consolas" panose="020B0609020204030204" pitchFamily="49" charset="0"/>
+            </a:endParaRPr>
+          </a:p>
+          <a:p>
+            <a:r>
+              <a:rPr lang="da-DK" sz="2800" b="1" smtClean="0">
+                <a:latin typeface="Consolas" panose="020B0609020204030204" pitchFamily="49" charset="0"/>
+              </a:rPr>
+              <a:t>    …</a:t>
+            </a:r>
+          </a:p>
+          <a:p>
+            <a:r>
+              <a:rPr lang="da-DK" sz="2800" b="1" smtClean="0">
+                <a:latin typeface="Consolas" panose="020B0609020204030204" pitchFamily="49" charset="0"/>
+              </a:rPr>
+              <a:t>}</a:t>
+            </a:r>
+          </a:p>
+        </p:txBody>
+      </p:sp>
+    </p:spTree>
+    <p:extLst>
+      <p:ext uri="{BB962C8B-B14F-4D97-AF65-F5344CB8AC3E}">
+        <p14:creationId xmlns:p14="http://schemas.microsoft.com/office/powerpoint/2010/main" val="2174583888"/>
+      </p:ext>
+    </p:extLst>
+  </p:cSld>
+  <p:clrMapOvr>
+    <a:masterClrMapping/>
+  </p:clrMapOvr>
+  <mc:AlternateContent xmlns:mc="http://schemas.openxmlformats.org/markup-compatibility/2006" xmlns:p14="http://schemas.microsoft.com/office/powerpoint/2010/main">
+    <mc:Choice Requires="p14">
+      <p:transition spd="med" p14:dur="700">
+        <p:fade/>
+      </p:transition>
+    </mc:Choice>
+    <mc:Fallback xmlns="">
+      <p:transition spd="med">
+        <p:fade/>
+      </p:transition>
+    </mc:Fallback>
+  </mc:AlternateContent>
+  <p:timing>
+    <p:tnLst>
+      <p:par>
+        <p:cTn id="1" dur="indefinite" restart="never" nodeType="tmRoot"/>
+      </p:par>
+    </p:tnLst>
+  </p:timing>
+</p:sld>
+</file>
+
+<file path=ppt/slides/slide2.xml><?xml version="1.0" encoding="utf-8"?>
+<p:sld xmlns:a="http://schemas.openxmlformats.org/drawingml/2006/main" xmlns:r="http://schemas.openxmlformats.org/officeDocument/2006/relationships" xmlns:p="http://schemas.openxmlformats.org/presentationml/2006/main">
+  <p:cSld>
+    <p:spTree>
+      <p:nvGrpSpPr>
+        <p:cNvPr id="1" name=""/>
+        <p:cNvGrpSpPr/>
+        <p:nvPr/>
+      </p:nvGrpSpPr>
+      <p:grpSpPr>
+        <a:xfrm>
+          <a:off x="0" y="0"/>
+          <a:ext cx="0" cy="0"/>
+          <a:chOff x="0" y="0"/>
+          <a:chExt cx="0" cy="0"/>
+        </a:xfrm>
+      </p:grpSpPr>
+      <p:sp>
+        <p:nvSpPr>
+          <p:cNvPr id="2" name="Tekstfelt 1"/>
+          <p:cNvSpPr txBox="1"/>
+          <p:nvPr/>
+        </p:nvSpPr>
+        <p:spPr>
+          <a:xfrm>
+            <a:off x="2081642" y="1513886"/>
+            <a:ext cx="8278228" cy="1015663"/>
+          </a:xfrm>
+          <a:prstGeom prst="rect">
+            <a:avLst/>
+          </a:prstGeom>
+          <a:noFill/>
+        </p:spPr>
+        <p:txBody>
+          <a:bodyPr wrap="none" rtlCol="0">
+            <a:spAutoFit/>
+          </a:bodyPr>
+          <a:lstStyle/>
+          <a:p>
+            <a:r>
+              <a:rPr lang="da-DK" b="1" smtClean="0"/>
+              <a:t> </a:t>
+            </a:r>
+            <a:r>
+              <a:rPr lang="da-DK" sz="6000" b="1" smtClean="0">
+                <a:solidFill>
+                  <a:schemeClr val="accent6">
+                    <a:lumMod val="75000"/>
+                  </a:schemeClr>
+                </a:solidFill>
+                <a:latin typeface="Consolas" panose="020B0609020204030204" pitchFamily="49" charset="0"/>
+              </a:rPr>
+              <a:t>Car</a:t>
+            </a:r>
+            <a:r>
+              <a:rPr lang="da-DK" sz="6000" b="1" smtClean="0">
+                <a:latin typeface="Consolas" panose="020B0609020204030204" pitchFamily="49" charset="0"/>
+              </a:rPr>
+              <a:t> c = </a:t>
+            </a:r>
+            <a:r>
+              <a:rPr lang="da-DK" sz="6000" b="1" smtClean="0">
+                <a:solidFill>
+                  <a:srgbClr val="0070C0"/>
+                </a:solidFill>
+                <a:latin typeface="Consolas" panose="020B0609020204030204" pitchFamily="49" charset="0"/>
+              </a:rPr>
+              <a:t>new</a:t>
+            </a:r>
+            <a:r>
+              <a:rPr lang="da-DK" sz="6000" b="1" smtClean="0">
+                <a:latin typeface="Consolas" panose="020B0609020204030204" pitchFamily="49" charset="0"/>
+              </a:rPr>
+              <a:t> </a:t>
+            </a:r>
+            <a:r>
+              <a:rPr lang="da-DK" sz="6000" b="1">
+                <a:solidFill>
+                  <a:schemeClr val="accent6">
+                    <a:lumMod val="75000"/>
+                  </a:schemeClr>
+                </a:solidFill>
+                <a:latin typeface="Consolas" panose="020B0609020204030204" pitchFamily="49" charset="0"/>
+              </a:rPr>
+              <a:t>Car</a:t>
+            </a:r>
+            <a:r>
+              <a:rPr lang="da-DK" sz="6000" b="1" smtClean="0">
+                <a:latin typeface="Consolas" panose="020B0609020204030204" pitchFamily="49" charset="0"/>
+              </a:rPr>
+              <a:t>(…);</a:t>
+            </a:r>
+            <a:endParaRPr lang="da-DK" sz="6000" b="1">
+              <a:latin typeface="Consolas" panose="020B0609020204030204" pitchFamily="49" charset="0"/>
+            </a:endParaRPr>
+          </a:p>
+        </p:txBody>
+      </p:sp>
+    </p:spTree>
+    <p:extLst>
+      <p:ext uri="{BB962C8B-B14F-4D97-AF65-F5344CB8AC3E}">
+        <p14:creationId xmlns:p14="http://schemas.microsoft.com/office/powerpoint/2010/main" val="9328745"/>
+      </p:ext>
+    </p:extLst>
+  </p:cSld>
+  <p:clrMapOvr>
+    <a:masterClrMapping/>
+  </p:clrMapOvr>
+  <p:timing>
+    <p:tnLst>
+      <p:par>
+        <p:cTn id="1" dur="indefinite" restart="never" nodeType="tmRoot"/>
+      </p:par>
+    </p:tnLst>
+  </p:timing>
+</p:sld>
+</file>
+
+<file path=ppt/slides/slide20.xml><?xml version="1.0" encoding="utf-8"?>
+<p:sld xmlns:a="http://schemas.openxmlformats.org/drawingml/2006/main" xmlns:r="http://schemas.openxmlformats.org/officeDocument/2006/relationships" xmlns:p="http://schemas.openxmlformats.org/presentationml/2006/main">
+  <p:cSld>
+    <p:spTree>
+      <p:nvGrpSpPr>
+        <p:cNvPr id="1" name=""/>
+        <p:cNvGrpSpPr/>
+        <p:nvPr/>
+      </p:nvGrpSpPr>
+      <p:grpSpPr>
+        <a:xfrm>
+          <a:off x="0" y="0"/>
+          <a:ext cx="0" cy="0"/>
+          <a:chOff x="0" y="0"/>
+          <a:chExt cx="0" cy="0"/>
+        </a:xfrm>
+      </p:grpSpPr>
+      <p:sp>
+        <p:nvSpPr>
+          <p:cNvPr id="2" name="Tekstfelt 1"/>
+          <p:cNvSpPr txBox="1"/>
+          <p:nvPr/>
+        </p:nvSpPr>
+        <p:spPr>
+          <a:xfrm>
+            <a:off x="920415" y="672345"/>
+            <a:ext cx="10485521" cy="1815882"/>
+          </a:xfrm>
+          <a:prstGeom prst="rect">
+            <a:avLst/>
+          </a:prstGeom>
+          <a:noFill/>
+        </p:spPr>
+        <p:txBody>
+          <a:bodyPr wrap="square" rtlCol="0">
+            <a:spAutoFit/>
+          </a:bodyPr>
+          <a:lstStyle/>
+          <a:p>
+            <a:r>
+              <a:rPr lang="da-DK" sz="2800" b="1" smtClean="0">
+                <a:solidFill>
+                  <a:srgbClr val="0070C0"/>
+                </a:solidFill>
+                <a:latin typeface="Consolas" panose="020B0609020204030204" pitchFamily="49" charset="0"/>
+              </a:rPr>
+              <a:t>static </a:t>
+            </a:r>
+            <a:r>
+              <a:rPr lang="da-DK" sz="2800" b="1" smtClean="0">
+                <a:latin typeface="Consolas" panose="020B0609020204030204" pitchFamily="49" charset="0"/>
+              </a:rPr>
+              <a:t>Car()</a:t>
+            </a:r>
+            <a:endParaRPr lang="da-DK" sz="2800" b="1">
+              <a:latin typeface="Consolas" panose="020B0609020204030204" pitchFamily="49" charset="0"/>
+            </a:endParaRPr>
+          </a:p>
+          <a:p>
+            <a:r>
+              <a:rPr lang="da-DK" sz="2800" b="1" smtClean="0">
+                <a:latin typeface="Consolas" panose="020B0609020204030204" pitchFamily="49" charset="0"/>
+              </a:rPr>
+              <a:t>{</a:t>
+            </a:r>
+          </a:p>
+          <a:p>
+            <a:r>
+              <a:rPr lang="da-DK" sz="2800" b="1">
+                <a:latin typeface="Consolas" panose="020B0609020204030204" pitchFamily="49" charset="0"/>
+              </a:rPr>
+              <a:t> </a:t>
+            </a:r>
+            <a:r>
+              <a:rPr lang="da-DK" sz="2800" b="1" smtClean="0">
+                <a:latin typeface="Consolas" panose="020B0609020204030204" pitchFamily="49" charset="0"/>
+              </a:rPr>
+              <a:t>   _noOfCarsCreated = 0;</a:t>
+            </a:r>
+          </a:p>
+          <a:p>
+            <a:r>
+              <a:rPr lang="da-DK" sz="2800" b="1" smtClean="0">
+                <a:latin typeface="Consolas" panose="020B0609020204030204" pitchFamily="49" charset="0"/>
+              </a:rPr>
+              <a:t>}</a:t>
+            </a:r>
+          </a:p>
+        </p:txBody>
+      </p:sp>
+    </p:spTree>
+    <p:extLst>
+      <p:ext uri="{BB962C8B-B14F-4D97-AF65-F5344CB8AC3E}">
+        <p14:creationId xmlns:p14="http://schemas.microsoft.com/office/powerpoint/2010/main" val="1879831211"/>
+      </p:ext>
+    </p:extLst>
+  </p:cSld>
+  <p:clrMapOvr>
+    <a:masterClrMapping/>
+  </p:clrMapOvr>
+  <mc:AlternateContent xmlns:mc="http://schemas.openxmlformats.org/markup-compatibility/2006" xmlns:p14="http://schemas.microsoft.com/office/powerpoint/2010/main">
+    <mc:Choice Requires="p14">
+      <p:transition spd="med" p14:dur="700">
+        <p:fade/>
+      </p:transition>
+    </mc:Choice>
+    <mc:Fallback xmlns="">
+      <p:transition spd="med">
+        <p:fade/>
+      </p:transition>
+    </mc:Fallback>
+  </mc:AlternateContent>
+  <p:timing>
+    <p:tnLst>
+      <p:par>
+        <p:cTn id="1" dur="indefinite" restart="never" nodeType="tmRoot"/>
+      </p:par>
+    </p:tnLst>
+  </p:timing>
+</p:sld>
+</file>
+
+<file path=ppt/slides/slide21.xml><?xml version="1.0" encoding="utf-8"?>
+<p:sld xmlns:a="http://schemas.openxmlformats.org/drawingml/2006/main" xmlns:r="http://schemas.openxmlformats.org/officeDocument/2006/relationships" xmlns:p="http://schemas.openxmlformats.org/presentationml/2006/main">
+  <p:cSld>
+    <p:spTree>
+      <p:nvGrpSpPr>
+        <p:cNvPr id="1" name=""/>
+        <p:cNvGrpSpPr/>
+        <p:nvPr/>
+      </p:nvGrpSpPr>
+      <p:grpSpPr>
+        <a:xfrm>
+          <a:off x="0" y="0"/>
+          <a:ext cx="0" cy="0"/>
+          <a:chOff x="0" y="0"/>
+          <a:chExt cx="0" cy="0"/>
+        </a:xfrm>
+      </p:grpSpPr>
+      <p:sp>
+        <p:nvSpPr>
           <p:cNvPr id="2" name="Tekstfelt 1"/>
           <p:cNvSpPr txBox="1"/>
           <p:nvPr/>
@@ -4347,14 +5464,6 @@
               </a:rPr>
               <a:t>CardDeck</a:t>
             </a:r>
-            <a:endParaRPr lang="da-DK" sz="2800" b="1" smtClean="0">
-              <a:solidFill>
-                <a:schemeClr val="accent6">
-                  <a:lumMod val="75000"/>
-                </a:schemeClr>
-              </a:solidFill>
-              <a:latin typeface="Consolas" panose="020B0609020204030204" pitchFamily="49" charset="0"/>
-            </a:endParaRPr>
           </a:p>
           <a:p>
             <a:r>
@@ -4448,9 +5557,6 @@
               </a:rPr>
               <a:t>    …</a:t>
             </a:r>
-            <a:endParaRPr lang="da-DK" sz="2800" b="1" smtClean="0">
-              <a:latin typeface="Consolas" panose="020B0609020204030204" pitchFamily="49" charset="0"/>
-            </a:endParaRPr>
           </a:p>
           <a:p>
             <a:r>
@@ -4459,9 +5565,6 @@
               </a:rPr>
               <a:t>}</a:t>
             </a:r>
-            <a:endParaRPr lang="da-DK" sz="2800" b="1" smtClean="0">
-              <a:latin typeface="Consolas" panose="020B0609020204030204" pitchFamily="49" charset="0"/>
-            </a:endParaRPr>
           </a:p>
         </p:txBody>
       </p:sp>
@@ -4485,7 +5588,7 @@
 </p:sld>
 </file>
 
-<file path=ppt/slides/slide17.xml><?xml version="1.0" encoding="utf-8"?>
+<file path=ppt/slides/slide22.xml><?xml version="1.0" encoding="utf-8"?>
 <p:sld xmlns:a="http://schemas.openxmlformats.org/drawingml/2006/main" xmlns:r="http://schemas.openxmlformats.org/officeDocument/2006/relationships" xmlns:p="http://schemas.openxmlformats.org/presentationml/2006/main">
   <p:cSld>
     <p:spTree>
@@ -4640,124 +5743,6 @@
 </p:sld>
 </file>
 
-<file path=ppt/slides/slide2.xml><?xml version="1.0" encoding="utf-8"?>
-<p:sld xmlns:a="http://schemas.openxmlformats.org/drawingml/2006/main" xmlns:r="http://schemas.openxmlformats.org/officeDocument/2006/relationships" xmlns:p="http://schemas.openxmlformats.org/presentationml/2006/main">
-  <p:cSld>
-    <p:spTree>
-      <p:nvGrpSpPr>
-        <p:cNvPr id="1" name=""/>
-        <p:cNvGrpSpPr/>
-        <p:nvPr/>
-      </p:nvGrpSpPr>
-      <p:grpSpPr>
-        <a:xfrm>
-          <a:off x="0" y="0"/>
-          <a:ext cx="0" cy="0"/>
-          <a:chOff x="0" y="0"/>
-          <a:chExt cx="0" cy="0"/>
-        </a:xfrm>
-      </p:grpSpPr>
-      <p:sp>
-        <p:nvSpPr>
-          <p:cNvPr id="2" name="Tekstfelt 1"/>
-          <p:cNvSpPr txBox="1"/>
-          <p:nvPr/>
-        </p:nvSpPr>
-        <p:spPr>
-          <a:xfrm>
-            <a:off x="2081642" y="1513886"/>
-            <a:ext cx="8278228" cy="1015663"/>
-          </a:xfrm>
-          <a:prstGeom prst="rect">
-            <a:avLst/>
-          </a:prstGeom>
-          <a:noFill/>
-        </p:spPr>
-        <p:txBody>
-          <a:bodyPr wrap="none" rtlCol="0">
-            <a:spAutoFit/>
-          </a:bodyPr>
-          <a:lstStyle/>
-          <a:p>
-            <a:r>
-              <a:rPr lang="da-DK" b="1" smtClean="0"/>
-              <a:t> </a:t>
-            </a:r>
-            <a:r>
-              <a:rPr lang="da-DK" sz="6000" b="1" smtClean="0">
-                <a:solidFill>
-                  <a:schemeClr val="accent6">
-                    <a:lumMod val="75000"/>
-                  </a:schemeClr>
-                </a:solidFill>
-                <a:latin typeface="Consolas" panose="020B0609020204030204" pitchFamily="49" charset="0"/>
-              </a:rPr>
-              <a:t>Car</a:t>
-            </a:r>
-            <a:r>
-              <a:rPr lang="da-DK" sz="6000" b="1" smtClean="0">
-                <a:latin typeface="Consolas" panose="020B0609020204030204" pitchFamily="49" charset="0"/>
-              </a:rPr>
-              <a:t> c = </a:t>
-            </a:r>
-            <a:r>
-              <a:rPr lang="da-DK" sz="6000" b="1" smtClean="0">
-                <a:solidFill>
-                  <a:srgbClr val="0070C0"/>
-                </a:solidFill>
-                <a:latin typeface="Consolas" panose="020B0609020204030204" pitchFamily="49" charset="0"/>
-              </a:rPr>
-              <a:t>new</a:t>
-            </a:r>
-            <a:r>
-              <a:rPr lang="da-DK" sz="6000" b="1" smtClean="0">
-                <a:latin typeface="Consolas" panose="020B0609020204030204" pitchFamily="49" charset="0"/>
-              </a:rPr>
-              <a:t> </a:t>
-            </a:r>
-            <a:r>
-              <a:rPr lang="da-DK" sz="6000" b="1">
-                <a:solidFill>
-                  <a:schemeClr val="accent6">
-                    <a:lumMod val="75000"/>
-                  </a:schemeClr>
-                </a:solidFill>
-                <a:latin typeface="Consolas" panose="020B0609020204030204" pitchFamily="49" charset="0"/>
-              </a:rPr>
-              <a:t>Car</a:t>
-            </a:r>
-            <a:r>
-              <a:rPr lang="da-DK" sz="6000" b="1" smtClean="0">
-                <a:latin typeface="Consolas" panose="020B0609020204030204" pitchFamily="49" charset="0"/>
-              </a:rPr>
-              <a:t>(…);</a:t>
-            </a:r>
-            <a:endParaRPr lang="da-DK" sz="6000" b="1">
-              <a:latin typeface="Consolas" panose="020B0609020204030204" pitchFamily="49" charset="0"/>
-            </a:endParaRPr>
-          </a:p>
-        </p:txBody>
-      </p:sp>
-    </p:spTree>
-    <p:extLst>
-      <p:ext uri="{BB962C8B-B14F-4D97-AF65-F5344CB8AC3E}">
-        <p14:creationId xmlns:p14="http://schemas.microsoft.com/office/powerpoint/2010/main" val="9328745"/>
-      </p:ext>
-    </p:extLst>
-  </p:cSld>
-  <p:clrMapOvr>
-    <a:masterClrMapping/>
-  </p:clrMapOvr>
-  <p:timing>
-    <p:tnLst>
-      <p:par>
-        <p:cTn id="1" dur="indefinite" restart="never" nodeType="tmRoot"/>
-      </p:par>
-    </p:tnLst>
-  </p:timing>
-</p:sld>
-</file>
-
 <file path=ppt/slides/slide3.xml><?xml version="1.0" encoding="utf-8"?>
 <p:sld xmlns:a="http://schemas.openxmlformats.org/drawingml/2006/main" xmlns:r="http://schemas.openxmlformats.org/officeDocument/2006/relationships" xmlns:p="http://schemas.openxmlformats.org/presentationml/2006/main">
   <p:cSld>
@@ -4944,13 +5929,13 @@
   <p:clrMapOvr>
     <a:masterClrMapping/>
   </p:clrMapOvr>
-  <mc:AlternateContent xmlns:mc="http://schemas.openxmlformats.org/markup-compatibility/2006">
-    <mc:Choice xmlns:p14="http://schemas.microsoft.com/office/powerpoint/2010/main" Requires="p14">
+  <mc:AlternateContent xmlns:mc="http://schemas.openxmlformats.org/markup-compatibility/2006" xmlns:p14="http://schemas.microsoft.com/office/powerpoint/2010/main">
+    <mc:Choice Requires="p14">
       <p:transition spd="med" p14:dur="700">
         <p:fade/>
       </p:transition>
     </mc:Choice>
-    <mc:Fallback>
+    <mc:Fallback xmlns="">
       <p:transition spd="med">
         <p:fade/>
       </p:transition>
@@ -5076,13 +6061,13 @@
   <p:clrMapOvr>
     <a:masterClrMapping/>
   </p:clrMapOvr>
-  <mc:AlternateContent xmlns:mc="http://schemas.openxmlformats.org/markup-compatibility/2006">
-    <mc:Choice xmlns:p14="http://schemas.microsoft.com/office/powerpoint/2010/main" Requires="p14">
+  <mc:AlternateContent xmlns:mc="http://schemas.openxmlformats.org/markup-compatibility/2006" xmlns:p14="http://schemas.microsoft.com/office/powerpoint/2010/main">
+    <mc:Choice Requires="p14">
       <p:transition spd="med" p14:dur="700">
         <p:fade/>
       </p:transition>
     </mc:Choice>
-    <mc:Fallback>
+    <mc:Fallback xmlns="">
       <p:transition spd="med">
         <p:fade/>
       </p:transition>
@@ -5153,19 +6138,7 @@
             <a:pPr algn="ctr"/>
             <a:r>
               <a:rPr lang="da-DK" sz="4800" smtClean="0"/>
-              <a:t>object </a:t>
-            </a:r>
-            <a:r>
-              <a:rPr lang="da-DK" sz="4800" smtClean="0"/>
-              <a:t>(</a:t>
-            </a:r>
-            <a:r>
-              <a:rPr lang="da-DK" sz="4800" smtClean="0"/>
-              <a:t>Math</a:t>
-            </a:r>
-            <a:r>
-              <a:rPr lang="da-DK" sz="4800" smtClean="0"/>
-              <a:t>)</a:t>
+              <a:t>object (Math)</a:t>
             </a:r>
             <a:endParaRPr lang="da-DK" sz="4800"/>
           </a:p>
@@ -5203,13 +6176,7 @@
               <a:rPr lang="da-DK" sz="6000" b="1" smtClean="0">
                 <a:latin typeface="Consolas" panose="020B0609020204030204" pitchFamily="49" charset="0"/>
               </a:rPr>
-              <a:t> </a:t>
-            </a:r>
-            <a:r>
-              <a:rPr lang="da-DK" sz="6000" b="1" smtClean="0">
-                <a:latin typeface="Consolas" panose="020B0609020204030204" pitchFamily="49" charset="0"/>
-              </a:rPr>
-              <a:t>=</a:t>
+              <a:t> =</a:t>
             </a:r>
             <a:endParaRPr lang="da-DK" sz="6000" b="1">
               <a:latin typeface="Consolas" panose="020B0609020204030204" pitchFamily="49" charset="0"/>
@@ -5270,13 +6237,7 @@
               <a:rPr lang="da-DK" sz="6000" b="1" smtClean="0">
                 <a:latin typeface="Consolas" panose="020B0609020204030204" pitchFamily="49" charset="0"/>
               </a:rPr>
-              <a:t> </a:t>
-            </a:r>
-            <a:r>
-              <a:rPr lang="da-DK" sz="6000" b="1" smtClean="0">
-                <a:latin typeface="Consolas" panose="020B0609020204030204" pitchFamily="49" charset="0"/>
-              </a:rPr>
-              <a:t>= </a:t>
+              <a:t> = </a:t>
             </a:r>
             <a:r>
               <a:rPr lang="da-DK" sz="6000" b="1" smtClean="0">
@@ -5401,14 +6362,6 @@
               </a:rPr>
               <a:t>Math</a:t>
             </a:r>
-            <a:endParaRPr lang="da-DK" sz="2800" b="1" smtClean="0">
-              <a:solidFill>
-                <a:schemeClr val="accent6">
-                  <a:lumMod val="75000"/>
-                </a:schemeClr>
-              </a:solidFill>
-              <a:latin typeface="Consolas" panose="020B0609020204030204" pitchFamily="49" charset="0"/>
-            </a:endParaRPr>
           </a:p>
           <a:p>
             <a:r>
@@ -5432,6 +6385,65 @@
                 </a:solidFill>
                 <a:latin typeface="Consolas" panose="020B0609020204030204" pitchFamily="49" charset="0"/>
               </a:rPr>
+              <a:t>public int</a:t>
+            </a:r>
+            <a:r>
+              <a:rPr lang="da-DK" sz="2800" b="1" smtClean="0">
+                <a:latin typeface="Consolas" panose="020B0609020204030204" pitchFamily="49" charset="0"/>
+              </a:rPr>
+              <a:t> Add(</a:t>
+            </a:r>
+            <a:r>
+              <a:rPr lang="da-DK" sz="2800" b="1">
+                <a:solidFill>
+                  <a:srgbClr val="0070C0"/>
+                </a:solidFill>
+                <a:latin typeface="Consolas" panose="020B0609020204030204" pitchFamily="49" charset="0"/>
+              </a:rPr>
+              <a:t>int</a:t>
+            </a:r>
+            <a:r>
+              <a:rPr lang="da-DK" sz="2800" b="1" smtClean="0">
+                <a:latin typeface="Consolas" panose="020B0609020204030204" pitchFamily="49" charset="0"/>
+              </a:rPr>
+              <a:t> a, </a:t>
+            </a:r>
+            <a:r>
+              <a:rPr lang="da-DK" sz="2800" b="1">
+                <a:solidFill>
+                  <a:srgbClr val="0070C0"/>
+                </a:solidFill>
+                <a:latin typeface="Consolas" panose="020B0609020204030204" pitchFamily="49" charset="0"/>
+              </a:rPr>
+              <a:t>int</a:t>
+            </a:r>
+            <a:r>
+              <a:rPr lang="da-DK" sz="2800" b="1" smtClean="0">
+                <a:latin typeface="Consolas" panose="020B0609020204030204" pitchFamily="49" charset="0"/>
+              </a:rPr>
+              <a:t> b) {…}</a:t>
+            </a:r>
+          </a:p>
+          <a:p>
+            <a:r>
+              <a:rPr lang="da-DK" sz="2800" b="1">
+                <a:latin typeface="Consolas" panose="020B0609020204030204" pitchFamily="49" charset="0"/>
+              </a:rPr>
+              <a:t> </a:t>
+            </a:r>
+            <a:r>
+              <a:rPr lang="da-DK" sz="2800" b="1" smtClean="0">
+                <a:latin typeface="Consolas" panose="020B0609020204030204" pitchFamily="49" charset="0"/>
+              </a:rPr>
+              <a:t>   </a:t>
+            </a:r>
+            <a:r>
+              <a:rPr lang="da-DK" sz="2800" b="1" smtClean="0">
+                <a:solidFill>
+                  <a:srgbClr val="0070C0"/>
+                </a:solidFill>
+                <a:latin typeface="Consolas" panose="020B0609020204030204" pitchFamily="49" charset="0"/>
+              </a:rPr>
               <a:t>public </a:t>
             </a:r>
             <a:r>
@@ -5444,13 +6456,19 @@
               <a:t>int</a:t>
             </a:r>
             <a:r>
-              <a:rPr lang="da-DK" sz="2800" b="1" smtClean="0">
-                <a:latin typeface="Consolas" panose="020B0609020204030204" pitchFamily="49" charset="0"/>
-              </a:rPr>
-              <a:t> Add(</a:t>
-            </a:r>
-            <a:r>
               <a:rPr lang="da-DK" sz="2800" b="1">
+                <a:latin typeface="Consolas" panose="020B0609020204030204" pitchFamily="49" charset="0"/>
+              </a:rPr>
+              <a:t> </a:t>
+            </a:r>
+            <a:r>
+              <a:rPr lang="da-DK" sz="2800" b="1" smtClean="0">
+                <a:latin typeface="Consolas" panose="020B0609020204030204" pitchFamily="49" charset="0"/>
+              </a:rPr>
+              <a:t>Subtract(</a:t>
+            </a:r>
+            <a:r>
+              <a:rPr lang="da-DK" sz="2800" b="1" smtClean="0">
                 <a:solidFill>
                   <a:srgbClr val="0070C0"/>
                 </a:solidFill>
@@ -5462,10 +6480,16 @@
               <a:rPr lang="da-DK" sz="2800" b="1" smtClean="0">
                 <a:latin typeface="Consolas" panose="020B0609020204030204" pitchFamily="49" charset="0"/>
               </a:rPr>
-              <a:t> a, </a:t>
+              <a:t> </a:t>
             </a:r>
             <a:r>
               <a:rPr lang="da-DK" sz="2800" b="1">
+                <a:latin typeface="Consolas" panose="020B0609020204030204" pitchFamily="49" charset="0"/>
+              </a:rPr>
+              <a:t>a, </a:t>
+            </a:r>
+            <a:r>
+              <a:rPr lang="da-DK" sz="2800" b="1">
                 <a:solidFill>
                   <a:srgbClr val="0070C0"/>
                 </a:solidFill>
@@ -5474,17 +6498,23 @@
               <a:t>int</a:t>
             </a:r>
             <a:r>
-              <a:rPr lang="da-DK" sz="2800" b="1" smtClean="0">
-                <a:latin typeface="Consolas" panose="020B0609020204030204" pitchFamily="49" charset="0"/>
-              </a:rPr>
-              <a:t> b) {…}</a:t>
-            </a:r>
-          </a:p>
-          <a:p>
-            <a:r>
               <a:rPr lang="da-DK" sz="2800" b="1">
                 <a:latin typeface="Consolas" panose="020B0609020204030204" pitchFamily="49" charset="0"/>
               </a:rPr>
+              <a:t> b) </a:t>
+            </a:r>
+            <a:r>
+              <a:rPr lang="da-DK" sz="2800" b="1" smtClean="0">
+                <a:latin typeface="Consolas" panose="020B0609020204030204" pitchFamily="49" charset="0"/>
+              </a:rPr>
+              <a:t>{…}</a:t>
+            </a:r>
+          </a:p>
+          <a:p>
+            <a:r>
+              <a:rPr lang="da-DK" sz="2800" b="1">
+                <a:latin typeface="Consolas" panose="020B0609020204030204" pitchFamily="49" charset="0"/>
+              </a:rPr>
               <a:t> </a:t>
             </a:r>
             <a:r>
@@ -5521,7 +6551,7 @@
               <a:rPr lang="da-DK" sz="2800" b="1" smtClean="0">
                 <a:latin typeface="Consolas" panose="020B0609020204030204" pitchFamily="49" charset="0"/>
               </a:rPr>
-              <a:t>Subtract(</a:t>
+              <a:t>Multiply(</a:t>
             </a:r>
             <a:r>
               <a:rPr lang="da-DK" sz="2800" b="1" smtClean="0">
@@ -5557,19 +6587,57 @@
               <a:rPr lang="da-DK" sz="2800" b="1">
                 <a:latin typeface="Consolas" panose="020B0609020204030204" pitchFamily="49" charset="0"/>
               </a:rPr>
-              <a:t> b</a:t>
-            </a:r>
+              <a:t> b) </a:t>
+            </a:r>
+            <a:r>
+              <a:rPr lang="da-DK" sz="2800" b="1" smtClean="0">
+                <a:latin typeface="Consolas" panose="020B0609020204030204" pitchFamily="49" charset="0"/>
+              </a:rPr>
+              <a:t>{…}</a:t>
+            </a:r>
+          </a:p>
+          <a:p>
             <a:r>
               <a:rPr lang="da-DK" sz="2800" b="1">
                 <a:latin typeface="Consolas" panose="020B0609020204030204" pitchFamily="49" charset="0"/>
               </a:rPr>
-              <a:t>) </a:t>
-            </a:r>
-            <a:r>
-              <a:rPr lang="da-DK" sz="2800" b="1" smtClean="0">
-                <a:latin typeface="Consolas" panose="020B0609020204030204" pitchFamily="49" charset="0"/>
-              </a:rPr>
-              <a:t>{…}</a:t>
+              <a:t> </a:t>
+            </a:r>
+            <a:r>
+              <a:rPr lang="da-DK" sz="2800" b="1" smtClean="0">
+                <a:latin typeface="Consolas" panose="020B0609020204030204" pitchFamily="49" charset="0"/>
+              </a:rPr>
+              <a:t>   </a:t>
+            </a:r>
+            <a:r>
+              <a:rPr lang="da-DK" sz="2800" b="1" smtClean="0">
+                <a:solidFill>
+                  <a:srgbClr val="0070C0"/>
+                </a:solidFill>
+                <a:latin typeface="Consolas" panose="020B0609020204030204" pitchFamily="49" charset="0"/>
+              </a:rPr>
+              <a:t>public bool</a:t>
+            </a:r>
+            <a:r>
+              <a:rPr lang="da-DK" sz="2800" b="1" smtClean="0">
+                <a:latin typeface="Consolas" panose="020B0609020204030204" pitchFamily="49" charset="0"/>
+              </a:rPr>
+              <a:t> IsPrime(</a:t>
+            </a:r>
+            <a:r>
+              <a:rPr lang="da-DK" sz="2800" b="1" smtClean="0">
+                <a:solidFill>
+                  <a:srgbClr val="0070C0"/>
+                </a:solidFill>
+                <a:latin typeface="Consolas" panose="020B0609020204030204" pitchFamily="49" charset="0"/>
+              </a:rPr>
+              <a:t>int</a:t>
+            </a:r>
+            <a:r>
+              <a:rPr lang="da-DK" sz="2800" b="1" smtClean="0">
+                <a:latin typeface="Consolas" panose="020B0609020204030204" pitchFamily="49" charset="0"/>
+              </a:rPr>
+              <a:t> a) {…}</a:t>
             </a:r>
           </a:p>
           <a:p>
@@ -5583,147 +6651,8 @@
               <a:rPr lang="da-DK" sz="2800" b="1" smtClean="0">
                 <a:latin typeface="Consolas" panose="020B0609020204030204" pitchFamily="49" charset="0"/>
               </a:rPr>
-              <a:t>   </a:t>
-            </a:r>
-            <a:r>
-              <a:rPr lang="da-DK" sz="2800" b="1" smtClean="0">
-                <a:solidFill>
-                  <a:srgbClr val="0070C0"/>
-                </a:solidFill>
-                <a:latin typeface="Consolas" panose="020B0609020204030204" pitchFamily="49" charset="0"/>
-              </a:rPr>
-              <a:t>public </a:t>
-            </a:r>
-            <a:r>
-              <a:rPr lang="da-DK" sz="2800" b="1">
-                <a:solidFill>
-                  <a:srgbClr val="0070C0"/>
-                </a:solidFill>
-                <a:latin typeface="Consolas" panose="020B0609020204030204" pitchFamily="49" charset="0"/>
-              </a:rPr>
-              <a:t>int</a:t>
-            </a:r>
-            <a:r>
-              <a:rPr lang="da-DK" sz="2800" b="1">
-                <a:latin typeface="Consolas" panose="020B0609020204030204" pitchFamily="49" charset="0"/>
-              </a:rPr>
-              <a:t> </a:t>
-            </a:r>
-            <a:r>
-              <a:rPr lang="da-DK" sz="2800" b="1" smtClean="0">
-                <a:latin typeface="Consolas" panose="020B0609020204030204" pitchFamily="49" charset="0"/>
-              </a:rPr>
-              <a:t>Multiply(</a:t>
-            </a:r>
-            <a:r>
-              <a:rPr lang="da-DK" sz="2800" b="1" smtClean="0">
-                <a:solidFill>
-                  <a:srgbClr val="0070C0"/>
-                </a:solidFill>
-                <a:latin typeface="Consolas" panose="020B0609020204030204" pitchFamily="49" charset="0"/>
-              </a:rPr>
-              <a:t>int</a:t>
-            </a:r>
-            <a:r>
-              <a:rPr lang="da-DK" sz="2800" b="1" smtClean="0">
-                <a:latin typeface="Consolas" panose="020B0609020204030204" pitchFamily="49" charset="0"/>
-              </a:rPr>
-              <a:t> </a:t>
-            </a:r>
-            <a:r>
-              <a:rPr lang="da-DK" sz="2800" b="1">
-                <a:latin typeface="Consolas" panose="020B0609020204030204" pitchFamily="49" charset="0"/>
-              </a:rPr>
-              <a:t>a, </a:t>
-            </a:r>
-            <a:r>
-              <a:rPr lang="da-DK" sz="2800" b="1">
-                <a:solidFill>
-                  <a:srgbClr val="0070C0"/>
-                </a:solidFill>
-                <a:latin typeface="Consolas" panose="020B0609020204030204" pitchFamily="49" charset="0"/>
-              </a:rPr>
-              <a:t>int</a:t>
-            </a:r>
-            <a:r>
-              <a:rPr lang="da-DK" sz="2800" b="1">
-                <a:latin typeface="Consolas" panose="020B0609020204030204" pitchFamily="49" charset="0"/>
-              </a:rPr>
-              <a:t> b</a:t>
-            </a:r>
-            <a:r>
-              <a:rPr lang="da-DK" sz="2800" b="1">
-                <a:latin typeface="Consolas" panose="020B0609020204030204" pitchFamily="49" charset="0"/>
-              </a:rPr>
-              <a:t>) </a:t>
-            </a:r>
-            <a:r>
-              <a:rPr lang="da-DK" sz="2800" b="1" smtClean="0">
-                <a:latin typeface="Consolas" panose="020B0609020204030204" pitchFamily="49" charset="0"/>
-              </a:rPr>
-              <a:t>{…}</a:t>
-            </a:r>
-          </a:p>
-          <a:p>
-            <a:r>
-              <a:rPr lang="da-DK" sz="2800" b="1">
-                <a:latin typeface="Consolas" panose="020B0609020204030204" pitchFamily="49" charset="0"/>
-              </a:rPr>
-              <a:t> </a:t>
-            </a:r>
-            <a:r>
-              <a:rPr lang="da-DK" sz="2800" b="1" smtClean="0">
-                <a:latin typeface="Consolas" panose="020B0609020204030204" pitchFamily="49" charset="0"/>
-              </a:rPr>
-              <a:t>   </a:t>
-            </a:r>
-            <a:r>
-              <a:rPr lang="da-DK" sz="2800" b="1" smtClean="0">
-                <a:solidFill>
-                  <a:srgbClr val="0070C0"/>
-                </a:solidFill>
-                <a:latin typeface="Consolas" panose="020B0609020204030204" pitchFamily="49" charset="0"/>
-              </a:rPr>
-              <a:t>public bool</a:t>
-            </a:r>
-            <a:r>
-              <a:rPr lang="da-DK" sz="2800" b="1" smtClean="0">
-                <a:latin typeface="Consolas" panose="020B0609020204030204" pitchFamily="49" charset="0"/>
-              </a:rPr>
-              <a:t> IsPrime(</a:t>
-            </a:r>
-            <a:r>
-              <a:rPr lang="da-DK" sz="2800" b="1" smtClean="0">
-                <a:solidFill>
-                  <a:srgbClr val="0070C0"/>
-                </a:solidFill>
-                <a:latin typeface="Consolas" panose="020B0609020204030204" pitchFamily="49" charset="0"/>
-              </a:rPr>
-              <a:t>int</a:t>
-            </a:r>
-            <a:r>
-              <a:rPr lang="da-DK" sz="2800" b="1" smtClean="0">
-                <a:latin typeface="Consolas" panose="020B0609020204030204" pitchFamily="49" charset="0"/>
-              </a:rPr>
-              <a:t> a) {…}</a:t>
-            </a:r>
-          </a:p>
-          <a:p>
-            <a:r>
-              <a:rPr lang="da-DK" sz="2800" b="1">
-                <a:latin typeface="Consolas" panose="020B0609020204030204" pitchFamily="49" charset="0"/>
-              </a:rPr>
-              <a:t> </a:t>
-            </a:r>
-            <a:r>
-              <a:rPr lang="da-DK" sz="2800" b="1" smtClean="0">
-                <a:latin typeface="Consolas" panose="020B0609020204030204" pitchFamily="49" charset="0"/>
-              </a:rPr>
               <a:t>   …</a:t>
             </a:r>
-            <a:endParaRPr lang="da-DK" sz="2800" b="1" smtClean="0">
-              <a:latin typeface="Consolas" panose="020B0609020204030204" pitchFamily="49" charset="0"/>
-            </a:endParaRPr>
           </a:p>
           <a:p>
             <a:r>
@@ -5848,13 +6777,7 @@
               <a:rPr lang="da-DK" sz="6000" b="1" smtClean="0">
                 <a:latin typeface="Consolas" panose="020B0609020204030204" pitchFamily="49" charset="0"/>
               </a:rPr>
-              <a:t> </a:t>
-            </a:r>
-            <a:r>
-              <a:rPr lang="da-DK" sz="6000" b="1" smtClean="0">
-                <a:latin typeface="Consolas" panose="020B0609020204030204" pitchFamily="49" charset="0"/>
-              </a:rPr>
-              <a:t>=</a:t>
+              <a:t> =</a:t>
             </a:r>
             <a:endParaRPr lang="da-DK" sz="6000" b="1">
               <a:latin typeface="Consolas" panose="020B0609020204030204" pitchFamily="49" charset="0"/>
@@ -5971,13 +6894,7 @@
               <a:rPr lang="da-DK" sz="6000" b="1" smtClean="0">
                 <a:latin typeface="Consolas" panose="020B0609020204030204" pitchFamily="49" charset="0"/>
               </a:rPr>
-              <a:t> </a:t>
-            </a:r>
-            <a:r>
-              <a:rPr lang="da-DK" sz="6000" b="1" smtClean="0">
-                <a:latin typeface="Consolas" panose="020B0609020204030204" pitchFamily="49" charset="0"/>
-              </a:rPr>
-              <a:t>=</a:t>
+              <a:t> =</a:t>
             </a:r>
             <a:endParaRPr lang="da-DK" sz="6000" b="1">
               <a:latin typeface="Consolas" panose="020B0609020204030204" pitchFamily="49" charset="0"/>
@@ -6044,13 +6961,13 @@
   <p:clrMapOvr>
     <a:masterClrMapping/>
   </p:clrMapOvr>
-  <mc:AlternateContent xmlns:mc="http://schemas.openxmlformats.org/markup-compatibility/2006">
-    <mc:Choice xmlns:p14="http://schemas.microsoft.com/office/powerpoint/2010/main" Requires="p14">
+  <mc:AlternateContent xmlns:mc="http://schemas.openxmlformats.org/markup-compatibility/2006" xmlns:p14="http://schemas.microsoft.com/office/powerpoint/2010/main">
+    <mc:Choice Requires="p14">
       <p:transition spd="med" p14:dur="700">
         <p:fade/>
       </p:transition>
     </mc:Choice>
-    <mc:Fallback>
+    <mc:Fallback xmlns="">
       <p:transition spd="med">
         <p:fade/>
       </p:transition>
@@ -6210,14 +7127,6 @@
               </a:rPr>
               <a:t>Math</a:t>
             </a:r>
-            <a:endParaRPr lang="da-DK" sz="2800" b="1" smtClean="0">
-              <a:solidFill>
-                <a:schemeClr val="accent6">
-                  <a:lumMod val="75000"/>
-                </a:schemeClr>
-              </a:solidFill>
-              <a:latin typeface="Consolas" panose="020B0609020204030204" pitchFamily="49" charset="0"/>
-            </a:endParaRPr>
           </a:p>
           <a:p>
             <a:r>
@@ -6378,13 +7287,96 @@
               <a:rPr lang="da-DK" sz="2800" b="1">
                 <a:latin typeface="Consolas" panose="020B0609020204030204" pitchFamily="49" charset="0"/>
               </a:rPr>
-              <a:t> b</a:t>
-            </a:r>
+              <a:t> b) </a:t>
+            </a:r>
+            <a:r>
+              <a:rPr lang="da-DK" sz="2800" b="1" smtClean="0">
+                <a:latin typeface="Consolas" panose="020B0609020204030204" pitchFamily="49" charset="0"/>
+              </a:rPr>
+              <a:t>{…}</a:t>
+            </a:r>
+          </a:p>
+          <a:p>
             <a:r>
               <a:rPr lang="da-DK" sz="2800" b="1">
                 <a:latin typeface="Consolas" panose="020B0609020204030204" pitchFamily="49" charset="0"/>
               </a:rPr>
-              <a:t>) </a:t>
+              <a:t> </a:t>
+            </a:r>
+            <a:r>
+              <a:rPr lang="da-DK" sz="2800" b="1" smtClean="0">
+                <a:latin typeface="Consolas" panose="020B0609020204030204" pitchFamily="49" charset="0"/>
+              </a:rPr>
+              <a:t>   </a:t>
+            </a:r>
+            <a:r>
+              <a:rPr lang="da-DK" sz="2800" b="1" smtClean="0">
+                <a:solidFill>
+                  <a:srgbClr val="0070C0"/>
+                </a:solidFill>
+                <a:latin typeface="Consolas" panose="020B0609020204030204" pitchFamily="49" charset="0"/>
+              </a:rPr>
+              <a:t>public </a:t>
+            </a:r>
+            <a:r>
+              <a:rPr lang="da-DK" sz="2800" b="1">
+                <a:solidFill>
+                  <a:srgbClr val="FF0000"/>
+                </a:solidFill>
+                <a:latin typeface="Consolas" panose="020B0609020204030204" pitchFamily="49" charset="0"/>
+              </a:rPr>
+              <a:t>static </a:t>
+            </a:r>
+            <a:r>
+              <a:rPr lang="da-DK" sz="2800" b="1" smtClean="0">
+                <a:solidFill>
+                  <a:srgbClr val="0070C0"/>
+                </a:solidFill>
+                <a:latin typeface="Consolas" panose="020B0609020204030204" pitchFamily="49" charset="0"/>
+              </a:rPr>
+              <a:t>int</a:t>
+            </a:r>
+            <a:r>
+              <a:rPr lang="da-DK" sz="2800" b="1" smtClean="0">
+                <a:latin typeface="Consolas" panose="020B0609020204030204" pitchFamily="49" charset="0"/>
+              </a:rPr>
+              <a:t> Multiply(</a:t>
+            </a:r>
+            <a:r>
+              <a:rPr lang="da-DK" sz="2800" b="1" smtClean="0">
+                <a:solidFill>
+                  <a:srgbClr val="0070C0"/>
+                </a:solidFill>
+                <a:latin typeface="Consolas" panose="020B0609020204030204" pitchFamily="49" charset="0"/>
+              </a:rPr>
+              <a:t>int</a:t>
+            </a:r>
+            <a:r>
+              <a:rPr lang="da-DK" sz="2800" b="1" smtClean="0">
+                <a:latin typeface="Consolas" panose="020B0609020204030204" pitchFamily="49" charset="0"/>
+              </a:rPr>
+              <a:t> </a:t>
+            </a:r>
+            <a:r>
+              <a:rPr lang="da-DK" sz="2800" b="1">
+                <a:latin typeface="Consolas" panose="020B0609020204030204" pitchFamily="49" charset="0"/>
+              </a:rPr>
+              <a:t>a, </a:t>
+            </a:r>
+            <a:r>
+              <a:rPr lang="da-DK" sz="2800" b="1">
+                <a:solidFill>
+                  <a:srgbClr val="0070C0"/>
+                </a:solidFill>
+                <a:latin typeface="Consolas" panose="020B0609020204030204" pitchFamily="49" charset="0"/>
+              </a:rPr>
+              <a:t>int</a:t>
+            </a:r>
+            <a:r>
+              <a:rPr lang="da-DK" sz="2800" b="1">
+                <a:latin typeface="Consolas" panose="020B0609020204030204" pitchFamily="49" charset="0"/>
+              </a:rPr>
+              <a:t> b) </a:t>
             </a:r>
             <a:r>
               <a:rPr lang="da-DK" sz="2800" b="1" smtClean="0">
@@ -6431,141 +7423,43 @@
                 </a:solidFill>
                 <a:latin typeface="Consolas" panose="020B0609020204030204" pitchFamily="49" charset="0"/>
               </a:rPr>
+              <a:t>bool</a:t>
+            </a:r>
+            <a:r>
+              <a:rPr lang="da-DK" sz="2800" b="1" smtClean="0">
+                <a:latin typeface="Consolas" panose="020B0609020204030204" pitchFamily="49" charset="0"/>
+              </a:rPr>
+              <a:t> IsPrime(</a:t>
+            </a:r>
+            <a:r>
+              <a:rPr lang="da-DK" sz="2800" b="1" smtClean="0">
+                <a:solidFill>
+                  <a:srgbClr val="0070C0"/>
+                </a:solidFill>
+                <a:latin typeface="Consolas" panose="020B0609020204030204" pitchFamily="49" charset="0"/>
+              </a:rPr>
               <a:t>int</a:t>
             </a:r>
             <a:r>
               <a:rPr lang="da-DK" sz="2800" b="1" smtClean="0">
                 <a:latin typeface="Consolas" panose="020B0609020204030204" pitchFamily="49" charset="0"/>
               </a:rPr>
-              <a:t> Multiply(</a:t>
-            </a:r>
-            <a:r>
-              <a:rPr lang="da-DK" sz="2800" b="1" smtClean="0">
-                <a:solidFill>
-                  <a:srgbClr val="0070C0"/>
-                </a:solidFill>
-                <a:latin typeface="Consolas" panose="020B0609020204030204" pitchFamily="49" charset="0"/>
-              </a:rPr>
-              <a:t>int</a:t>
-            </a:r>
-            <a:r>
-              <a:rPr lang="da-DK" sz="2800" b="1" smtClean="0">
+              <a:t> a) {…}</a:t>
+            </a:r>
+          </a:p>
+          <a:p>
+            <a:r>
+              <a:rPr lang="da-DK" sz="2800" b="1">
                 <a:latin typeface="Consolas" panose="020B0609020204030204" pitchFamily="49" charset="0"/>
               </a:rPr>
               <a:t> </a:t>
             </a:r>
             <a:r>
-              <a:rPr lang="da-DK" sz="2800" b="1">
-                <a:latin typeface="Consolas" panose="020B0609020204030204" pitchFamily="49" charset="0"/>
-              </a:rPr>
-              <a:t>a, </a:t>
-            </a:r>
-            <a:r>
-              <a:rPr lang="da-DK" sz="2800" b="1">
-                <a:solidFill>
-                  <a:srgbClr val="0070C0"/>
-                </a:solidFill>
-                <a:latin typeface="Consolas" panose="020B0609020204030204" pitchFamily="49" charset="0"/>
-              </a:rPr>
-              <a:t>int</a:t>
-            </a:r>
-            <a:r>
-              <a:rPr lang="da-DK" sz="2800" b="1">
-                <a:latin typeface="Consolas" panose="020B0609020204030204" pitchFamily="49" charset="0"/>
-              </a:rPr>
-              <a:t> b</a:t>
-            </a:r>
-            <a:r>
-              <a:rPr lang="da-DK" sz="2800" b="1">
-                <a:latin typeface="Consolas" panose="020B0609020204030204" pitchFamily="49" charset="0"/>
-              </a:rPr>
-              <a:t>) </a:t>
-            </a:r>
-            <a:r>
-              <a:rPr lang="da-DK" sz="2800" b="1" smtClean="0">
-                <a:latin typeface="Consolas" panose="020B0609020204030204" pitchFamily="49" charset="0"/>
-              </a:rPr>
-              <a:t>{…}</a:t>
-            </a:r>
-          </a:p>
-          <a:p>
-            <a:r>
-              <a:rPr lang="da-DK" sz="2800" b="1">
-                <a:latin typeface="Consolas" panose="020B0609020204030204" pitchFamily="49" charset="0"/>
-              </a:rPr>
-              <a:t> </a:t>
-            </a:r>
-            <a:r>
-              <a:rPr lang="da-DK" sz="2800" b="1" smtClean="0">
-                <a:latin typeface="Consolas" panose="020B0609020204030204" pitchFamily="49" charset="0"/>
-              </a:rPr>
-              <a:t>   </a:t>
-            </a:r>
-            <a:r>
-              <a:rPr lang="da-DK" sz="2800" b="1" smtClean="0">
-                <a:solidFill>
-                  <a:srgbClr val="0070C0"/>
-                </a:solidFill>
-                <a:latin typeface="Consolas" panose="020B0609020204030204" pitchFamily="49" charset="0"/>
-              </a:rPr>
-              <a:t>public </a:t>
-            </a:r>
-            <a:r>
-              <a:rPr lang="da-DK" sz="2800" b="1">
-                <a:solidFill>
-                  <a:srgbClr val="FF0000"/>
-                </a:solidFill>
-                <a:latin typeface="Consolas" panose="020B0609020204030204" pitchFamily="49" charset="0"/>
-              </a:rPr>
-              <a:t>static </a:t>
-            </a:r>
-            <a:r>
-              <a:rPr lang="da-DK" sz="2800" b="1" smtClean="0">
-                <a:solidFill>
-                  <a:srgbClr val="0070C0"/>
-                </a:solidFill>
-                <a:latin typeface="Consolas" panose="020B0609020204030204" pitchFamily="49" charset="0"/>
-              </a:rPr>
-              <a:t>bool</a:t>
-            </a:r>
-            <a:r>
-              <a:rPr lang="da-DK" sz="2800" b="1" smtClean="0">
-                <a:latin typeface="Consolas" panose="020B0609020204030204" pitchFamily="49" charset="0"/>
-              </a:rPr>
-              <a:t> IsPrime(</a:t>
-            </a:r>
-            <a:r>
-              <a:rPr lang="da-DK" sz="2800" b="1" smtClean="0">
-                <a:solidFill>
-                  <a:srgbClr val="0070C0"/>
-                </a:solidFill>
-                <a:latin typeface="Consolas" panose="020B0609020204030204" pitchFamily="49" charset="0"/>
-              </a:rPr>
-              <a:t>int</a:t>
-            </a:r>
-            <a:r>
-              <a:rPr lang="da-DK" sz="2800" b="1" smtClean="0">
-                <a:latin typeface="Consolas" panose="020B0609020204030204" pitchFamily="49" charset="0"/>
-              </a:rPr>
-              <a:t> a) {…}</a:t>
-            </a:r>
-          </a:p>
-          <a:p>
-            <a:r>
-              <a:rPr lang="da-DK" sz="2800" b="1">
-                <a:latin typeface="Consolas" panose="020B0609020204030204" pitchFamily="49" charset="0"/>
-              </a:rPr>
-              <a:t> </a:t>
-            </a:r>
-            <a:r>
               <a:rPr lang="da-DK" sz="2800" b="1" smtClean="0">
                 <a:latin typeface="Consolas" panose="020B0609020204030204" pitchFamily="49" charset="0"/>
               </a:rPr>
               <a:t>   …</a:t>
             </a:r>
-            <a:endParaRPr lang="da-DK" sz="2800" b="1" smtClean="0">
-              <a:latin typeface="Consolas" panose="020B0609020204030204" pitchFamily="49" charset="0"/>
-            </a:endParaRPr>
           </a:p>
           <a:p>
             <a:r>

</xml_diff>